<commit_message>
current time bar position changed; system struture added on spec.ppt.
</commit_message>
<xml_diff>
--- a/docs/功能简介.pptx
+++ b/docs/功能简介.pptx
@@ -7,6 +7,7 @@
   <p:sldIdLst>
     <p:sldId id="256" r:id="rId2"/>
     <p:sldId id="257" r:id="rId3"/>
+    <p:sldId id="259" r:id="rId4"/>
   </p:sldIdLst>
   <p:sldSz cx="9144000" cy="6858000" type="screen4x3"/>
   <p:notesSz cx="6858000" cy="9144000"/>
@@ -290,7 +291,7 @@
             <a:fld id="{530820CF-B880-4189-942D-D702A7CBA730}" type="datetimeFigureOut">
               <a:rPr lang="zh-CN" altLang="en-US" smtClean="0"/>
               <a:pPr/>
-              <a:t>2014/1/23</a:t>
+              <a:t>2014/3/6</a:t>
             </a:fld>
             <a:endParaRPr lang="zh-CN" altLang="en-US"/>
           </a:p>
@@ -457,7 +458,7 @@
             <a:fld id="{530820CF-B880-4189-942D-D702A7CBA730}" type="datetimeFigureOut">
               <a:rPr lang="zh-CN" altLang="en-US" smtClean="0"/>
               <a:pPr/>
-              <a:t>2014/1/23</a:t>
+              <a:t>2014/3/6</a:t>
             </a:fld>
             <a:endParaRPr lang="zh-CN" altLang="en-US"/>
           </a:p>
@@ -634,7 +635,7 @@
             <a:fld id="{530820CF-B880-4189-942D-D702A7CBA730}" type="datetimeFigureOut">
               <a:rPr lang="zh-CN" altLang="en-US" smtClean="0"/>
               <a:pPr/>
-              <a:t>2014/1/23</a:t>
+              <a:t>2014/3/6</a:t>
             </a:fld>
             <a:endParaRPr lang="zh-CN" altLang="en-US"/>
           </a:p>
@@ -801,7 +802,7 @@
             <a:fld id="{530820CF-B880-4189-942D-D702A7CBA730}" type="datetimeFigureOut">
               <a:rPr lang="zh-CN" altLang="en-US" smtClean="0"/>
               <a:pPr/>
-              <a:t>2014/1/23</a:t>
+              <a:t>2014/3/6</a:t>
             </a:fld>
             <a:endParaRPr lang="zh-CN" altLang="en-US"/>
           </a:p>
@@ -1044,7 +1045,7 @@
             <a:fld id="{530820CF-B880-4189-942D-D702A7CBA730}" type="datetimeFigureOut">
               <a:rPr lang="zh-CN" altLang="en-US" smtClean="0"/>
               <a:pPr/>
-              <a:t>2014/1/23</a:t>
+              <a:t>2014/3/6</a:t>
             </a:fld>
             <a:endParaRPr lang="zh-CN" altLang="en-US"/>
           </a:p>
@@ -1329,7 +1330,7 @@
             <a:fld id="{530820CF-B880-4189-942D-D702A7CBA730}" type="datetimeFigureOut">
               <a:rPr lang="zh-CN" altLang="en-US" smtClean="0"/>
               <a:pPr/>
-              <a:t>2014/1/23</a:t>
+              <a:t>2014/3/6</a:t>
             </a:fld>
             <a:endParaRPr lang="zh-CN" altLang="en-US"/>
           </a:p>
@@ -1748,7 +1749,7 @@
             <a:fld id="{530820CF-B880-4189-942D-D702A7CBA730}" type="datetimeFigureOut">
               <a:rPr lang="zh-CN" altLang="en-US" smtClean="0"/>
               <a:pPr/>
-              <a:t>2014/1/23</a:t>
+              <a:t>2014/3/6</a:t>
             </a:fld>
             <a:endParaRPr lang="zh-CN" altLang="en-US"/>
           </a:p>
@@ -1863,7 +1864,7 @@
             <a:fld id="{530820CF-B880-4189-942D-D702A7CBA730}" type="datetimeFigureOut">
               <a:rPr lang="zh-CN" altLang="en-US" smtClean="0"/>
               <a:pPr/>
-              <a:t>2014/1/23</a:t>
+              <a:t>2014/3/6</a:t>
             </a:fld>
             <a:endParaRPr lang="zh-CN" altLang="en-US"/>
           </a:p>
@@ -1955,7 +1956,7 @@
             <a:fld id="{530820CF-B880-4189-942D-D702A7CBA730}" type="datetimeFigureOut">
               <a:rPr lang="zh-CN" altLang="en-US" smtClean="0"/>
               <a:pPr/>
-              <a:t>2014/1/23</a:t>
+              <a:t>2014/3/6</a:t>
             </a:fld>
             <a:endParaRPr lang="zh-CN" altLang="en-US"/>
           </a:p>
@@ -2229,7 +2230,7 @@
             <a:fld id="{530820CF-B880-4189-942D-D702A7CBA730}" type="datetimeFigureOut">
               <a:rPr lang="zh-CN" altLang="en-US" smtClean="0"/>
               <a:pPr/>
-              <a:t>2014/1/23</a:t>
+              <a:t>2014/3/6</a:t>
             </a:fld>
             <a:endParaRPr lang="zh-CN" altLang="en-US"/>
           </a:p>
@@ -2479,7 +2480,7 @@
             <a:fld id="{530820CF-B880-4189-942D-D702A7CBA730}" type="datetimeFigureOut">
               <a:rPr lang="zh-CN" altLang="en-US" smtClean="0"/>
               <a:pPr/>
-              <a:t>2014/1/23</a:t>
+              <a:t>2014/3/6</a:t>
             </a:fld>
             <a:endParaRPr lang="zh-CN" altLang="en-US"/>
           </a:p>
@@ -2689,7 +2690,7 @@
             <a:fld id="{530820CF-B880-4189-942D-D702A7CBA730}" type="datetimeFigureOut">
               <a:rPr lang="zh-CN" altLang="en-US" smtClean="0"/>
               <a:pPr/>
-              <a:t>2014/1/23</a:t>
+              <a:t>2014/3/6</a:t>
             </a:fld>
             <a:endParaRPr lang="zh-CN" altLang="en-US"/>
           </a:p>
@@ -3081,14 +3082,124 @@
             <p:ph type="ctrTitle"/>
           </p:nvPr>
         </p:nvSpPr>
-        <p:spPr/>
-        <p:txBody>
-          <a:bodyPr/>
+        <p:spPr>
+          <a:xfrm>
+            <a:off x="838200" y="4581128"/>
+            <a:ext cx="7772400" cy="1470025"/>
+          </a:xfrm>
+        </p:spPr>
+        <p:txBody>
+          <a:bodyPr>
+            <a:normAutofit/>
+          </a:bodyPr>
           <a:lstStyle/>
           <a:p>
             <a:pPr algn="l"/>
             <a:r>
-              <a:rPr lang="zh-CN" altLang="en-US" dirty="0" smtClean="0">
+              <a:rPr lang="en-US" altLang="zh-CN" sz="2600" dirty="0" err="1" smtClean="0">
+                <a:solidFill>
+                  <a:schemeClr val="bg1">
+                    <a:lumMod val="95000"/>
+                  </a:schemeClr>
+                </a:solidFill>
+                <a:latin typeface="Arial Unicode MS" pitchFamily="34" charset="-122"/>
+                <a:ea typeface="Arial Unicode MS" pitchFamily="34" charset="-122"/>
+                <a:cs typeface="Arial Unicode MS" pitchFamily="34" charset="-122"/>
+              </a:rPr>
+              <a:t>Titron</a:t>
+            </a:r>
+            <a:r>
+              <a:rPr lang="en-US" altLang="zh-CN" sz="2600" dirty="0" smtClean="0">
+                <a:solidFill>
+                  <a:schemeClr val="bg1">
+                    <a:lumMod val="95000"/>
+                  </a:schemeClr>
+                </a:solidFill>
+                <a:latin typeface="Arial Unicode MS" pitchFamily="34" charset="-122"/>
+                <a:ea typeface="Arial Unicode MS" pitchFamily="34" charset="-122"/>
+                <a:cs typeface="Arial Unicode MS" pitchFamily="34" charset="-122"/>
+              </a:rPr>
+              <a:t/>
+            </a:r>
+            <a:br>
+              <a:rPr lang="en-US" altLang="zh-CN" sz="2600" dirty="0" smtClean="0">
+                <a:solidFill>
+                  <a:schemeClr val="bg1">
+                    <a:lumMod val="95000"/>
+                  </a:schemeClr>
+                </a:solidFill>
+                <a:latin typeface="Arial Unicode MS" pitchFamily="34" charset="-122"/>
+                <a:ea typeface="Arial Unicode MS" pitchFamily="34" charset="-122"/>
+                <a:cs typeface="Arial Unicode MS" pitchFamily="34" charset="-122"/>
+              </a:rPr>
+            </a:br>
+            <a:r>
+              <a:rPr lang="en-US" altLang="zh-CN" sz="2600" dirty="0" smtClean="0">
+                <a:solidFill>
+                  <a:schemeClr val="bg1">
+                    <a:lumMod val="95000"/>
+                  </a:schemeClr>
+                </a:solidFill>
+                <a:latin typeface="Arial Unicode MS" pitchFamily="34" charset="-122"/>
+                <a:ea typeface="Arial Unicode MS" pitchFamily="34" charset="-122"/>
+                <a:cs typeface="Arial Unicode MS" pitchFamily="34" charset="-122"/>
+              </a:rPr>
+              <a:t>hawkdtw@gmail.com</a:t>
+            </a:r>
+            <a:endParaRPr lang="zh-CN" altLang="en-US" sz="2600" dirty="0">
+              <a:solidFill>
+                <a:schemeClr val="bg1">
+                  <a:lumMod val="95000"/>
+                </a:schemeClr>
+              </a:solidFill>
+              <a:latin typeface="Arial Unicode MS" pitchFamily="34" charset="-122"/>
+              <a:ea typeface="Arial Unicode MS" pitchFamily="34" charset="-122"/>
+              <a:cs typeface="Arial Unicode MS" pitchFamily="34" charset="-122"/>
+            </a:endParaRPr>
+          </a:p>
+        </p:txBody>
+      </p:sp>
+      <p:sp>
+        <p:nvSpPr>
+          <p:cNvPr id="3" name="标题 1"/>
+          <p:cNvSpPr txBox="1">
+            <a:spLocks/>
+          </p:cNvSpPr>
+          <p:nvPr/>
+        </p:nvSpPr>
+        <p:spPr>
+          <a:xfrm>
+            <a:off x="838200" y="2282825"/>
+            <a:ext cx="7772400" cy="1470025"/>
+          </a:xfrm>
+          <a:prstGeom prst="rect">
+            <a:avLst/>
+          </a:prstGeom>
+        </p:spPr>
+        <p:txBody>
+          <a:bodyPr vert="horz" lIns="91440" tIns="45720" rIns="91440" bIns="45720" rtlCol="0" anchor="ctr">
+            <a:normAutofit/>
+          </a:bodyPr>
+          <a:lstStyle>
+            <a:lvl1pPr algn="ctr" defTabSz="914400" rtl="0" eaLnBrk="1" latinLnBrk="0" hangingPunct="1">
+              <a:spcBef>
+                <a:spcPct val="0"/>
+              </a:spcBef>
+              <a:buNone/>
+              <a:defRPr sz="4400" kern="1200">
+                <a:solidFill>
+                  <a:schemeClr val="tx1"/>
+                </a:solidFill>
+                <a:latin typeface="+mj-lt"/>
+                <a:ea typeface="+mj-ea"/>
+                <a:cs typeface="+mj-cs"/>
+              </a:defRPr>
+            </a:lvl1pPr>
+          </a:lstStyle>
+          <a:p>
+            <a:pPr algn="l"/>
+            <a:r>
+              <a:rPr lang="zh-CN" altLang="en-US" smtClean="0">
                 <a:solidFill>
                   <a:schemeClr val="bg1">
                     <a:lumMod val="95000"/>
@@ -3101,7 +3212,7 @@
               <a:t>自动喂食器</a:t>
             </a:r>
             <a:r>
-              <a:rPr lang="en-US" altLang="zh-CN" dirty="0" smtClean="0">
+              <a:rPr lang="en-US" altLang="zh-CN" smtClean="0">
                 <a:solidFill>
                   <a:schemeClr val="bg1">
                     <a:lumMod val="95000"/>
@@ -3114,7 +3225,7 @@
               <a:t>——</a:t>
             </a:r>
             <a:r>
-              <a:rPr lang="zh-CN" altLang="en-US" dirty="0" smtClean="0">
+              <a:rPr lang="zh-CN" altLang="en-US" smtClean="0">
                 <a:solidFill>
                   <a:schemeClr val="bg1">
                     <a:lumMod val="95000"/>
@@ -3183,10 +3294,10 @@
         </p:nvGrpSpPr>
         <p:grpSpPr>
           <a:xfrm>
-            <a:off x="3347864" y="548680"/>
-            <a:ext cx="5400600" cy="2808312"/>
+            <a:off x="1763688" y="2912089"/>
+            <a:ext cx="5544616" cy="2808312"/>
             <a:chOff x="1619672" y="1628800"/>
-            <a:chExt cx="5400600" cy="2808312"/>
+            <a:chExt cx="5544616" cy="2808312"/>
           </a:xfrm>
         </p:grpSpPr>
         <p:sp>
@@ -3280,8 +3391,8 @@
           </p:nvSpPr>
           <p:spPr>
             <a:xfrm>
-              <a:off x="1979712" y="1988840"/>
-              <a:ext cx="2808312" cy="923330"/>
+              <a:off x="3006536" y="2519444"/>
+              <a:ext cx="1313436" cy="369332"/>
             </a:xfrm>
             <a:prstGeom prst="rect">
               <a:avLst/>
@@ -3300,64 +3411,7 @@
                   <a:ea typeface="Arial Unicode MS" pitchFamily="34" charset="-122"/>
                   <a:cs typeface="Arial Unicode MS" pitchFamily="34" charset="-122"/>
                 </a:rPr>
-                <a:t>当前时间：</a:t>
-              </a:r>
-              <a:r>
-                <a:rPr lang="en-US" altLang="zh-CN" dirty="0" smtClean="0">
-                  <a:latin typeface="Arial Unicode MS" pitchFamily="34" charset="-122"/>
-                  <a:ea typeface="Arial Unicode MS" pitchFamily="34" charset="-122"/>
-                  <a:cs typeface="Arial Unicode MS" pitchFamily="34" charset="-122"/>
-                </a:rPr>
                 <a:t> </a:t>
-              </a:r>
-              <a:r>
-                <a:rPr lang="en-US" altLang="zh-CN" dirty="0" smtClean="0">
-                  <a:latin typeface="Arial Unicode MS" pitchFamily="34" charset="-122"/>
-                  <a:ea typeface="Arial Unicode MS" pitchFamily="34" charset="-122"/>
-                  <a:cs typeface="Arial Unicode MS" pitchFamily="34" charset="-122"/>
-                </a:rPr>
-                <a:t>08:45:00</a:t>
-              </a:r>
-            </a:p>
-            <a:p>
-              <a:r>
-                <a:rPr lang="zh-CN" altLang="en-US" dirty="0" smtClean="0">
-                  <a:latin typeface="Arial Unicode MS" pitchFamily="34" charset="-122"/>
-                  <a:ea typeface="Arial Unicode MS" pitchFamily="34" charset="-122"/>
-                  <a:cs typeface="Arial Unicode MS" pitchFamily="34" charset="-122"/>
-                </a:rPr>
-                <a:t>自动</a:t>
-              </a:r>
-              <a:r>
-                <a:rPr lang="en-US" altLang="zh-CN" dirty="0" smtClean="0">
-                  <a:latin typeface="Arial Unicode MS" pitchFamily="34" charset="-122"/>
-                  <a:ea typeface="Arial Unicode MS" pitchFamily="34" charset="-122"/>
-                  <a:cs typeface="Arial Unicode MS" pitchFamily="34" charset="-122"/>
-                </a:rPr>
-                <a:t>/</a:t>
-              </a:r>
-              <a:r>
-                <a:rPr lang="zh-CN" altLang="en-US" dirty="0" smtClean="0">
-                  <a:latin typeface="Arial Unicode MS" pitchFamily="34" charset="-122"/>
-                  <a:ea typeface="Arial Unicode MS" pitchFamily="34" charset="-122"/>
-                  <a:cs typeface="Arial Unicode MS" pitchFamily="34" charset="-122"/>
-                </a:rPr>
-                <a:t>手动</a:t>
-              </a:r>
-              <a:endParaRPr lang="en-US" altLang="zh-CN" dirty="0" smtClean="0">
-                <a:latin typeface="Arial Unicode MS" pitchFamily="34" charset="-122"/>
-                <a:ea typeface="Arial Unicode MS" pitchFamily="34" charset="-122"/>
-                <a:cs typeface="Arial Unicode MS" pitchFamily="34" charset="-122"/>
-              </a:endParaRPr>
-            </a:p>
-            <a:p>
-              <a:r>
-                <a:rPr lang="zh-CN" altLang="en-US" dirty="0" smtClean="0">
-                  <a:latin typeface="Arial Unicode MS" pitchFamily="34" charset="-122"/>
-                  <a:ea typeface="Arial Unicode MS" pitchFamily="34" charset="-122"/>
-                  <a:cs typeface="Arial Unicode MS" pitchFamily="34" charset="-122"/>
-                </a:rPr>
-                <a:t>喂食时刻： </a:t>
               </a:r>
               <a:r>
                 <a:rPr lang="en-US" altLang="zh-CN" dirty="0" smtClean="0">
@@ -3383,8 +3437,8 @@
           </p:nvSpPr>
           <p:spPr>
             <a:xfrm>
-              <a:off x="4788024" y="1988840"/>
-              <a:ext cx="1944216" cy="923330"/>
+              <a:off x="5580112" y="2326260"/>
+              <a:ext cx="1584176" cy="646331"/>
             </a:xfrm>
             <a:prstGeom prst="rect">
               <a:avLst/>
@@ -3398,12 +3452,12 @@
             <a:lstStyle/>
             <a:p>
               <a:r>
-                <a:rPr lang="zh-CN" altLang="en-US" dirty="0" smtClean="0">
+                <a:rPr lang="en-US" altLang="zh-CN" dirty="0" smtClean="0">
                   <a:latin typeface="Arial Unicode MS" pitchFamily="34" charset="-122"/>
                   <a:ea typeface="Arial Unicode MS" pitchFamily="34" charset="-122"/>
                   <a:cs typeface="Arial Unicode MS" pitchFamily="34" charset="-122"/>
                 </a:rPr>
-                <a:t>温度：</a:t>
+                <a:t>25.0 </a:t>
               </a:r>
               <a:r>
                 <a:rPr lang="en-US" altLang="zh-CN" dirty="0" smtClean="0">
@@ -3411,24 +3465,17 @@
                   <a:ea typeface="Arial Unicode MS" pitchFamily="34" charset="-122"/>
                   <a:cs typeface="Arial Unicode MS" pitchFamily="34" charset="-122"/>
                 </a:rPr>
-                <a:t>25.0 ℃</a:t>
+                <a:t>℃</a:t>
               </a:r>
             </a:p>
             <a:p>
-              <a:endParaRPr lang="en-US" altLang="zh-CN" dirty="0" smtClean="0">
-                <a:latin typeface="Arial Unicode MS" pitchFamily="34" charset="-122"/>
-                <a:ea typeface="Arial Unicode MS" pitchFamily="34" charset="-122"/>
-                <a:cs typeface="Arial Unicode MS" pitchFamily="34" charset="-122"/>
-              </a:endParaRPr>
-            </a:p>
-            <a:p>
               <a:r>
-                <a:rPr lang="zh-CN" altLang="en-US" dirty="0" smtClean="0">
+                <a:rPr lang="en-US" altLang="zh-CN" dirty="0" smtClean="0">
                   <a:latin typeface="Arial Unicode MS" pitchFamily="34" charset="-122"/>
                   <a:ea typeface="Arial Unicode MS" pitchFamily="34" charset="-122"/>
                   <a:cs typeface="Arial Unicode MS" pitchFamily="34" charset="-122"/>
                 </a:rPr>
-                <a:t>湿度：</a:t>
+                <a:t>35    </a:t>
               </a:r>
               <a:r>
                 <a:rPr lang="en-US" altLang="zh-CN" dirty="0" smtClean="0">
@@ -3436,7 +3483,7 @@
                   <a:ea typeface="Arial Unicode MS" pitchFamily="34" charset="-122"/>
                   <a:cs typeface="Arial Unicode MS" pitchFamily="34" charset="-122"/>
                 </a:rPr>
-                <a:t>35    %RH</a:t>
+                <a:t>%RH</a:t>
               </a:r>
               <a:endParaRPr lang="zh-CN" altLang="en-US" dirty="0">
                 <a:latin typeface="Arial Unicode MS" pitchFamily="34" charset="-122"/>
@@ -3491,51 +3538,13 @@
         </p:sp>
         <p:sp>
           <p:nvSpPr>
-            <p:cNvPr id="12" name="TextBox 11"/>
-            <p:cNvSpPr txBox="1"/>
-            <p:nvPr/>
-          </p:nvSpPr>
-          <p:spPr>
-            <a:xfrm>
-              <a:off x="1907704" y="3861048"/>
-              <a:ext cx="720080" cy="369332"/>
-            </a:xfrm>
-            <a:prstGeom prst="rect">
-              <a:avLst/>
-            </a:prstGeom>
-            <a:noFill/>
-          </p:spPr>
-          <p:txBody>
-            <a:bodyPr wrap="square" rtlCol="0">
-              <a:spAutoFit/>
-            </a:bodyPr>
-            <a:lstStyle/>
-            <a:p>
-              <a:r>
-                <a:rPr lang="zh-CN" altLang="en-US" dirty="0" smtClean="0">
-                  <a:latin typeface="Arial Unicode MS" pitchFamily="34" charset="-122"/>
-                  <a:ea typeface="Arial Unicode MS" pitchFamily="34" charset="-122"/>
-                  <a:cs typeface="Arial Unicode MS" pitchFamily="34" charset="-122"/>
-                </a:rPr>
-                <a:t>设置</a:t>
-              </a:r>
-              <a:endParaRPr lang="zh-CN" altLang="en-US" dirty="0">
-                <a:latin typeface="Arial Unicode MS" pitchFamily="34" charset="-122"/>
-                <a:ea typeface="Arial Unicode MS" pitchFamily="34" charset="-122"/>
-                <a:cs typeface="Arial Unicode MS" pitchFamily="34" charset="-122"/>
-              </a:endParaRPr>
-            </a:p>
-          </p:txBody>
-        </p:sp>
-        <p:sp>
-          <p:nvSpPr>
             <p:cNvPr id="13" name="椭圆 12"/>
             <p:cNvSpPr/>
             <p:nvPr/>
           </p:nvSpPr>
           <p:spPr>
             <a:xfrm>
-              <a:off x="4067944" y="3284984"/>
+              <a:off x="2850042" y="3284984"/>
               <a:ext cx="432048" cy="432048"/>
             </a:xfrm>
             <a:prstGeom prst="ellipse">
@@ -3572,51 +3581,13 @@
         </p:sp>
         <p:sp>
           <p:nvSpPr>
-            <p:cNvPr id="14" name="TextBox 13"/>
-            <p:cNvSpPr txBox="1"/>
-            <p:nvPr/>
-          </p:nvSpPr>
-          <p:spPr>
-            <a:xfrm>
-              <a:off x="3923928" y="3861048"/>
-              <a:ext cx="720080" cy="369332"/>
-            </a:xfrm>
-            <a:prstGeom prst="rect">
-              <a:avLst/>
-            </a:prstGeom>
-            <a:noFill/>
-          </p:spPr>
-          <p:txBody>
-            <a:bodyPr wrap="square" rtlCol="0">
-              <a:spAutoFit/>
-            </a:bodyPr>
-            <a:lstStyle/>
-            <a:p>
-              <a:r>
-                <a:rPr lang="zh-CN" altLang="en-US" dirty="0" smtClean="0">
-                  <a:latin typeface="Arial Unicode MS" pitchFamily="34" charset="-122"/>
-                  <a:ea typeface="Arial Unicode MS" pitchFamily="34" charset="-122"/>
-                  <a:cs typeface="Arial Unicode MS" pitchFamily="34" charset="-122"/>
-                </a:rPr>
-                <a:t>向上</a:t>
-              </a:r>
-              <a:endParaRPr lang="zh-CN" altLang="en-US" dirty="0">
-                <a:latin typeface="Arial Unicode MS" pitchFamily="34" charset="-122"/>
-                <a:ea typeface="Arial Unicode MS" pitchFamily="34" charset="-122"/>
-                <a:cs typeface="Arial Unicode MS" pitchFamily="34" charset="-122"/>
-              </a:endParaRPr>
-            </a:p>
-          </p:txBody>
-        </p:sp>
-        <p:sp>
-          <p:nvSpPr>
             <p:cNvPr id="15" name="椭圆 14"/>
             <p:cNvSpPr/>
             <p:nvPr/>
           </p:nvSpPr>
           <p:spPr>
             <a:xfrm>
-              <a:off x="5076056" y="3284984"/>
+              <a:off x="5508104" y="3284984"/>
               <a:ext cx="432048" cy="432048"/>
             </a:xfrm>
             <a:prstGeom prst="ellipse">
@@ -3659,13 +3630,15 @@
           </p:nvSpPr>
           <p:spPr>
             <a:xfrm>
-              <a:off x="4932040" y="3861048"/>
-              <a:ext cx="720080" cy="369332"/>
+              <a:off x="4932040" y="4043247"/>
+              <a:ext cx="1872208" cy="369332"/>
             </a:xfrm>
             <a:prstGeom prst="rect">
               <a:avLst/>
             </a:prstGeom>
-            <a:noFill/>
+            <a:solidFill>
+              <a:srgbClr val="FFFF00"/>
+            </a:solidFill>
           </p:spPr>
           <p:txBody>
             <a:bodyPr wrap="square" rtlCol="0">
@@ -3674,12 +3647,12 @@
             <a:lstStyle/>
             <a:p>
               <a:r>
-                <a:rPr lang="zh-CN" altLang="en-US" dirty="0" smtClean="0">
+                <a:rPr lang="en-US" altLang="zh-CN" dirty="0" smtClean="0">
                   <a:latin typeface="Arial Unicode MS" pitchFamily="34" charset="-122"/>
                   <a:ea typeface="Arial Unicode MS" pitchFamily="34" charset="-122"/>
                   <a:cs typeface="Arial Unicode MS" pitchFamily="34" charset="-122"/>
                 </a:rPr>
-                <a:t>向下</a:t>
+                <a:t>Adjust feed hour</a:t>
               </a:r>
               <a:endParaRPr lang="zh-CN" altLang="en-US" dirty="0">
                 <a:latin typeface="Arial Unicode MS" pitchFamily="34" charset="-122"/>
@@ -3732,44 +3705,6 @@
             </a:p>
           </p:txBody>
         </p:sp>
-        <p:sp>
-          <p:nvSpPr>
-            <p:cNvPr id="18" name="TextBox 17"/>
-            <p:cNvSpPr txBox="1"/>
-            <p:nvPr/>
-          </p:nvSpPr>
-          <p:spPr>
-            <a:xfrm>
-              <a:off x="6012160" y="3861048"/>
-              <a:ext cx="720080" cy="369332"/>
-            </a:xfrm>
-            <a:prstGeom prst="rect">
-              <a:avLst/>
-            </a:prstGeom>
-            <a:noFill/>
-          </p:spPr>
-          <p:txBody>
-            <a:bodyPr wrap="square" rtlCol="0">
-              <a:spAutoFit/>
-            </a:bodyPr>
-            <a:lstStyle/>
-            <a:p>
-              <a:r>
-                <a:rPr lang="zh-CN" altLang="en-US" dirty="0" smtClean="0">
-                  <a:latin typeface="Arial Unicode MS" pitchFamily="34" charset="-122"/>
-                  <a:ea typeface="Arial Unicode MS" pitchFamily="34" charset="-122"/>
-                  <a:cs typeface="Arial Unicode MS" pitchFamily="34" charset="-122"/>
-                </a:rPr>
-                <a:t>确认</a:t>
-              </a:r>
-              <a:endParaRPr lang="zh-CN" altLang="en-US" dirty="0">
-                <a:latin typeface="Arial Unicode MS" pitchFamily="34" charset="-122"/>
-                <a:ea typeface="Arial Unicode MS" pitchFamily="34" charset="-122"/>
-                <a:cs typeface="Arial Unicode MS" pitchFamily="34" charset="-122"/>
-              </a:endParaRPr>
-            </a:p>
-          </p:txBody>
-        </p:sp>
       </p:grpSp>
       <p:sp>
         <p:nvSpPr>
@@ -3783,8 +3718,8 @@
         </p:nvSpPr>
         <p:spPr>
           <a:xfrm>
-            <a:off x="755576" y="3068960"/>
-            <a:ext cx="7772400" cy="2952328"/>
+            <a:off x="323528" y="-87610"/>
+            <a:ext cx="7772400" cy="2331640"/>
           </a:xfrm>
         </p:spPr>
         <p:txBody>
@@ -3805,7 +3740,20 @@
                 <a:ea typeface="Arial Unicode MS" pitchFamily="34" charset="-122"/>
                 <a:cs typeface="Arial Unicode MS" pitchFamily="34" charset="-122"/>
               </a:rPr>
-              <a:t>* 显示</a:t>
+              <a:t>* 当前</a:t>
+            </a:r>
+            <a:r>
+              <a:rPr lang="zh-CN" altLang="en-US" sz="2400" dirty="0" smtClean="0">
+                <a:solidFill>
+                  <a:schemeClr val="bg1">
+                    <a:lumMod val="95000"/>
+                  </a:schemeClr>
+                </a:solidFill>
+                <a:latin typeface="Arial Unicode MS" pitchFamily="34" charset="-122"/>
+                <a:ea typeface="Arial Unicode MS" pitchFamily="34" charset="-122"/>
+                <a:cs typeface="Arial Unicode MS" pitchFamily="34" charset="-122"/>
+              </a:rPr>
+              <a:t>时间、</a:t>
             </a:r>
             <a:r>
               <a:rPr lang="en-US" altLang="zh-CN" sz="2400" dirty="0" smtClean="0">
@@ -3869,7 +3817,7 @@
                 <a:ea typeface="Arial Unicode MS" pitchFamily="34" charset="-122"/>
                 <a:cs typeface="Arial Unicode MS" pitchFamily="34" charset="-122"/>
               </a:rPr>
-              <a:t>当前时间、</a:t>
+              <a:t>当前温度、湿度</a:t>
             </a:r>
             <a:r>
               <a:rPr lang="en-US" altLang="zh-CN" sz="2400" dirty="0" smtClean="0">
@@ -3897,32 +3845,6 @@
               </a:rPr>
             </a:br>
             <a:r>
-              <a:rPr lang="en-US" altLang="zh-CN" sz="2400" dirty="0">
-                <a:solidFill>
-                  <a:schemeClr val="bg1">
-                    <a:lumMod val="95000"/>
-                  </a:schemeClr>
-                </a:solidFill>
-                <a:latin typeface="Arial Unicode MS" pitchFamily="34" charset="-122"/>
-                <a:ea typeface="Arial Unicode MS" pitchFamily="34" charset="-122"/>
-                <a:cs typeface="Arial Unicode MS" pitchFamily="34" charset="-122"/>
-              </a:rPr>
-              <a:t> </a:t>
-            </a:r>
-            <a:r>
-              <a:rPr lang="en-US" altLang="zh-CN" sz="2400" dirty="0" smtClean="0">
-                <a:solidFill>
-                  <a:schemeClr val="bg1">
-                    <a:lumMod val="95000"/>
-                  </a:schemeClr>
-                </a:solidFill>
-                <a:latin typeface="Arial Unicode MS" pitchFamily="34" charset="-122"/>
-                <a:ea typeface="Arial Unicode MS" pitchFamily="34" charset="-122"/>
-                <a:cs typeface="Arial Unicode MS" pitchFamily="34" charset="-122"/>
-              </a:rPr>
-              <a:t> </a:t>
-            </a:r>
-            <a:r>
               <a:rPr lang="zh-CN" altLang="en-US" sz="2400" dirty="0" smtClean="0">
                 <a:solidFill>
                   <a:schemeClr val="bg1">
@@ -3933,123 +3855,8 @@
                 <a:ea typeface="Arial Unicode MS" pitchFamily="34" charset="-122"/>
                 <a:cs typeface="Arial Unicode MS" pitchFamily="34" charset="-122"/>
               </a:rPr>
-              <a:t>当前温度、湿度</a:t>
-            </a:r>
-            <a:r>
-              <a:rPr lang="en-US" altLang="zh-CN" sz="2400" dirty="0" smtClean="0">
-                <a:solidFill>
-                  <a:schemeClr val="bg1">
-                    <a:lumMod val="95000"/>
-                  </a:schemeClr>
-                </a:solidFill>
-                <a:latin typeface="Arial Unicode MS" pitchFamily="34" charset="-122"/>
-                <a:ea typeface="Arial Unicode MS" pitchFamily="34" charset="-122"/>
-                <a:cs typeface="Arial Unicode MS" pitchFamily="34" charset="-122"/>
-              </a:rPr>
-              <a:t/>
-            </a:r>
-            <a:br>
-              <a:rPr lang="en-US" altLang="zh-CN" sz="2400" dirty="0" smtClean="0">
-                <a:solidFill>
-                  <a:schemeClr val="bg1">
-                    <a:lumMod val="95000"/>
-                  </a:schemeClr>
-                </a:solidFill>
-                <a:latin typeface="Arial Unicode MS" pitchFamily="34" charset="-122"/>
-                <a:ea typeface="Arial Unicode MS" pitchFamily="34" charset="-122"/>
-                <a:cs typeface="Arial Unicode MS" pitchFamily="34" charset="-122"/>
-              </a:rPr>
-            </a:br>
-            <a:r>
-              <a:rPr lang="en-US" altLang="zh-CN" sz="2400" dirty="0">
-                <a:solidFill>
-                  <a:schemeClr val="bg1">
-                    <a:lumMod val="95000"/>
-                  </a:schemeClr>
-                </a:solidFill>
-                <a:latin typeface="Arial Unicode MS" pitchFamily="34" charset="-122"/>
-                <a:ea typeface="Arial Unicode MS" pitchFamily="34" charset="-122"/>
-                <a:cs typeface="Arial Unicode MS" pitchFamily="34" charset="-122"/>
-              </a:rPr>
-              <a:t> </a:t>
-            </a:r>
-            <a:r>
-              <a:rPr lang="en-US" altLang="zh-CN" sz="2400" dirty="0" smtClean="0">
-                <a:solidFill>
-                  <a:schemeClr val="bg1">
-                    <a:lumMod val="95000"/>
-                  </a:schemeClr>
-                </a:solidFill>
-                <a:latin typeface="Arial Unicode MS" pitchFamily="34" charset="-122"/>
-                <a:ea typeface="Arial Unicode MS" pitchFamily="34" charset="-122"/>
-                <a:cs typeface="Arial Unicode MS" pitchFamily="34" charset="-122"/>
-              </a:rPr>
-              <a:t> </a:t>
-            </a:r>
-            <a:r>
-              <a:rPr lang="zh-CN" altLang="en-US" sz="2400" dirty="0" smtClean="0">
-                <a:solidFill>
-                  <a:schemeClr val="bg1">
-                    <a:lumMod val="95000"/>
-                  </a:schemeClr>
-                </a:solidFill>
-                <a:latin typeface="Arial Unicode MS" pitchFamily="34" charset="-122"/>
-                <a:ea typeface="Arial Unicode MS" pitchFamily="34" charset="-122"/>
-                <a:cs typeface="Arial Unicode MS" pitchFamily="34" charset="-122"/>
-              </a:rPr>
-              <a:t>当前喂食模式（自动</a:t>
-            </a:r>
-            <a:r>
-              <a:rPr lang="en-US" altLang="zh-CN" sz="2400" dirty="0" smtClean="0">
-                <a:solidFill>
-                  <a:schemeClr val="bg1">
-                    <a:lumMod val="95000"/>
-                  </a:schemeClr>
-                </a:solidFill>
-                <a:latin typeface="Arial Unicode MS" pitchFamily="34" charset="-122"/>
-                <a:ea typeface="Arial Unicode MS" pitchFamily="34" charset="-122"/>
-                <a:cs typeface="Arial Unicode MS" pitchFamily="34" charset="-122"/>
-              </a:rPr>
-              <a:t>/</a:t>
-            </a:r>
-            <a:r>
-              <a:rPr lang="zh-CN" altLang="en-US" sz="2400" dirty="0" smtClean="0">
-                <a:solidFill>
-                  <a:schemeClr val="bg1">
-                    <a:lumMod val="95000"/>
-                  </a:schemeClr>
-                </a:solidFill>
-                <a:latin typeface="Arial Unicode MS" pitchFamily="34" charset="-122"/>
-                <a:ea typeface="Arial Unicode MS" pitchFamily="34" charset="-122"/>
-                <a:cs typeface="Arial Unicode MS" pitchFamily="34" charset="-122"/>
-              </a:rPr>
-              <a:t>手动）</a:t>
-            </a:r>
-            <a:r>
-              <a:rPr lang="en-US" altLang="zh-CN" sz="2400" dirty="0" smtClean="0">
-                <a:solidFill>
-                  <a:schemeClr val="bg1">
-                    <a:lumMod val="95000"/>
-                  </a:schemeClr>
-                </a:solidFill>
-                <a:latin typeface="Arial Unicode MS" pitchFamily="34" charset="-122"/>
-                <a:ea typeface="Arial Unicode MS" pitchFamily="34" charset="-122"/>
-                <a:cs typeface="Arial Unicode MS" pitchFamily="34" charset="-122"/>
-              </a:rPr>
-              <a:t/>
-            </a:r>
-            <a:br>
-              <a:rPr lang="en-US" altLang="zh-CN" sz="2400" dirty="0" smtClean="0">
-                <a:solidFill>
-                  <a:schemeClr val="bg1">
-                    <a:lumMod val="95000"/>
-                  </a:schemeClr>
-                </a:solidFill>
-                <a:latin typeface="Arial Unicode MS" pitchFamily="34" charset="-122"/>
-                <a:ea typeface="Arial Unicode MS" pitchFamily="34" charset="-122"/>
-                <a:cs typeface="Arial Unicode MS" pitchFamily="34" charset="-122"/>
-              </a:rPr>
-            </a:br>
+              <a:t>* 设置</a:t>
+            </a:r>
             <a:r>
               <a:rPr lang="en-US" altLang="zh-CN" sz="2400" dirty="0" smtClean="0">
                 <a:solidFill>
@@ -4074,7 +3881,7 @@
                 <a:ea typeface="Arial Unicode MS" pitchFamily="34" charset="-122"/>
                 <a:cs typeface="Arial Unicode MS" pitchFamily="34" charset="-122"/>
               </a:rPr>
-              <a:t>自动</a:t>
+              <a:t>当前时间、喂食</a:t>
             </a:r>
             <a:r>
               <a:rPr lang="zh-CN" altLang="en-US" sz="2400" dirty="0" smtClean="0">
@@ -4087,96 +3894,7 @@
                 <a:ea typeface="Arial Unicode MS" pitchFamily="34" charset="-122"/>
                 <a:cs typeface="Arial Unicode MS" pitchFamily="34" charset="-122"/>
               </a:rPr>
-              <a:t>喂食时间</a:t>
-            </a:r>
-            <a:r>
-              <a:rPr lang="en-US" altLang="zh-CN" sz="2400" dirty="0" smtClean="0">
-                <a:solidFill>
-                  <a:schemeClr val="bg1">
-                    <a:lumMod val="95000"/>
-                  </a:schemeClr>
-                </a:solidFill>
-                <a:latin typeface="Arial Unicode MS" pitchFamily="34" charset="-122"/>
-                <a:ea typeface="Arial Unicode MS" pitchFamily="34" charset="-122"/>
-                <a:cs typeface="Arial Unicode MS" pitchFamily="34" charset="-122"/>
-              </a:rPr>
-              <a:t/>
-            </a:r>
-            <a:br>
-              <a:rPr lang="en-US" altLang="zh-CN" sz="2400" dirty="0" smtClean="0">
-                <a:solidFill>
-                  <a:schemeClr val="bg1">
-                    <a:lumMod val="95000"/>
-                  </a:schemeClr>
-                </a:solidFill>
-                <a:latin typeface="Arial Unicode MS" pitchFamily="34" charset="-122"/>
-                <a:ea typeface="Arial Unicode MS" pitchFamily="34" charset="-122"/>
-                <a:cs typeface="Arial Unicode MS" pitchFamily="34" charset="-122"/>
-              </a:rPr>
-            </a:br>
-            <a:r>
-              <a:rPr lang="zh-CN" altLang="en-US" sz="2400" dirty="0" smtClean="0">
-                <a:solidFill>
-                  <a:schemeClr val="bg1">
-                    <a:lumMod val="95000"/>
-                  </a:schemeClr>
-                </a:solidFill>
-                <a:latin typeface="Arial Unicode MS" pitchFamily="34" charset="-122"/>
-                <a:ea typeface="Arial Unicode MS" pitchFamily="34" charset="-122"/>
-                <a:cs typeface="Arial Unicode MS" pitchFamily="34" charset="-122"/>
-              </a:rPr>
-              <a:t>* 设置</a:t>
-            </a:r>
-            <a:r>
-              <a:rPr lang="en-US" altLang="zh-CN" sz="2400" dirty="0" smtClean="0">
-                <a:solidFill>
-                  <a:schemeClr val="bg1">
-                    <a:lumMod val="95000"/>
-                  </a:schemeClr>
-                </a:solidFill>
-                <a:latin typeface="Arial Unicode MS" pitchFamily="34" charset="-122"/>
-                <a:ea typeface="Arial Unicode MS" pitchFamily="34" charset="-122"/>
-                <a:cs typeface="Arial Unicode MS" pitchFamily="34" charset="-122"/>
-              </a:rPr>
-              <a:t/>
-            </a:r>
-            <a:br>
-              <a:rPr lang="en-US" altLang="zh-CN" sz="2400" dirty="0" smtClean="0">
-                <a:solidFill>
-                  <a:schemeClr val="bg1">
-                    <a:lumMod val="95000"/>
-                  </a:schemeClr>
-                </a:solidFill>
-                <a:latin typeface="Arial Unicode MS" pitchFamily="34" charset="-122"/>
-                <a:ea typeface="Arial Unicode MS" pitchFamily="34" charset="-122"/>
-                <a:cs typeface="Arial Unicode MS" pitchFamily="34" charset="-122"/>
-              </a:rPr>
-            </a:br>
-            <a:r>
-              <a:rPr lang="en-US" altLang="zh-CN" sz="2400" dirty="0" smtClean="0">
-                <a:solidFill>
-                  <a:schemeClr val="bg1">
-                    <a:lumMod val="95000"/>
-                  </a:schemeClr>
-                </a:solidFill>
-                <a:latin typeface="Arial Unicode MS" pitchFamily="34" charset="-122"/>
-                <a:ea typeface="Arial Unicode MS" pitchFamily="34" charset="-122"/>
-                <a:cs typeface="Arial Unicode MS" pitchFamily="34" charset="-122"/>
-              </a:rPr>
-              <a:t>  </a:t>
-            </a:r>
-            <a:r>
-              <a:rPr lang="zh-CN" altLang="en-US" sz="2400" dirty="0" smtClean="0">
-                <a:solidFill>
-                  <a:schemeClr val="bg1">
-                    <a:lumMod val="95000"/>
-                  </a:schemeClr>
-                </a:solidFill>
-                <a:latin typeface="Arial Unicode MS" pitchFamily="34" charset="-122"/>
-                <a:ea typeface="Arial Unicode MS" pitchFamily="34" charset="-122"/>
-                <a:cs typeface="Arial Unicode MS" pitchFamily="34" charset="-122"/>
-              </a:rPr>
-              <a:t>当前时间、喂食时间、喂食模式（自动、手动）</a:t>
+              <a:t>时间</a:t>
             </a:r>
             <a:endParaRPr lang="zh-CN" altLang="en-US" sz="2400" dirty="0">
               <a:solidFill>
@@ -4191,7 +3909,1537 @@
           </a:p>
         </p:txBody>
       </p:sp>
+      <p:sp>
+        <p:nvSpPr>
+          <p:cNvPr id="21" name="TextBox 20"/>
+          <p:cNvSpPr txBox="1"/>
+          <p:nvPr/>
+        </p:nvSpPr>
+        <p:spPr>
+          <a:xfrm>
+            <a:off x="2060687" y="3134674"/>
+            <a:ext cx="2808312" cy="369332"/>
+          </a:xfrm>
+          <a:prstGeom prst="rect">
+            <a:avLst/>
+          </a:prstGeom>
+          <a:noFill/>
+        </p:spPr>
+        <p:txBody>
+          <a:bodyPr wrap="square" rtlCol="0">
+            <a:spAutoFit/>
+          </a:bodyPr>
+          <a:lstStyle/>
+          <a:p>
+            <a:r>
+              <a:rPr lang="en-US" altLang="zh-CN" u="sng" dirty="0" err="1" smtClean="0">
+                <a:latin typeface="Arial Unicode MS" pitchFamily="34" charset="-122"/>
+                <a:ea typeface="Arial Unicode MS" pitchFamily="34" charset="-122"/>
+                <a:cs typeface="Arial Unicode MS" pitchFamily="34" charset="-122"/>
+              </a:rPr>
+              <a:t>AutoFeeder</a:t>
+            </a:r>
+            <a:endParaRPr lang="zh-CN" altLang="en-US" u="sng" dirty="0">
+              <a:latin typeface="Arial Unicode MS" pitchFamily="34" charset="-122"/>
+              <a:ea typeface="Arial Unicode MS" pitchFamily="34" charset="-122"/>
+              <a:cs typeface="Arial Unicode MS" pitchFamily="34" charset="-122"/>
+            </a:endParaRPr>
+          </a:p>
+        </p:txBody>
+      </p:sp>
+      <p:sp>
+        <p:nvSpPr>
+          <p:cNvPr id="22" name="TextBox 21"/>
+          <p:cNvSpPr txBox="1"/>
+          <p:nvPr/>
+        </p:nvSpPr>
+        <p:spPr>
+          <a:xfrm>
+            <a:off x="5701503" y="3142507"/>
+            <a:ext cx="1188132" cy="369332"/>
+          </a:xfrm>
+          <a:prstGeom prst="rect">
+            <a:avLst/>
+          </a:prstGeom>
+          <a:noFill/>
+        </p:spPr>
+        <p:txBody>
+          <a:bodyPr wrap="square" rtlCol="0">
+            <a:spAutoFit/>
+          </a:bodyPr>
+          <a:lstStyle/>
+          <a:p>
+            <a:r>
+              <a:rPr lang="en-US" altLang="zh-CN" dirty="0" smtClean="0">
+                <a:latin typeface="Arial Unicode MS" pitchFamily="34" charset="-122"/>
+                <a:ea typeface="Arial Unicode MS" pitchFamily="34" charset="-122"/>
+                <a:cs typeface="Arial Unicode MS" pitchFamily="34" charset="-122"/>
+              </a:rPr>
+              <a:t>08:45:00</a:t>
+            </a:r>
+            <a:endParaRPr lang="zh-CN" altLang="en-US" dirty="0">
+              <a:latin typeface="Arial Unicode MS" pitchFamily="34" charset="-122"/>
+              <a:ea typeface="Arial Unicode MS" pitchFamily="34" charset="-122"/>
+              <a:cs typeface="Arial Unicode MS" pitchFamily="34" charset="-122"/>
+            </a:endParaRPr>
+          </a:p>
+        </p:txBody>
+      </p:sp>
+      <p:sp>
+        <p:nvSpPr>
+          <p:cNvPr id="23" name="TextBox 22"/>
+          <p:cNvSpPr txBox="1"/>
+          <p:nvPr/>
+        </p:nvSpPr>
+        <p:spPr>
+          <a:xfrm>
+            <a:off x="3995936" y="2542757"/>
+            <a:ext cx="1656184" cy="369332"/>
+          </a:xfrm>
+          <a:prstGeom prst="rect">
+            <a:avLst/>
+          </a:prstGeom>
+          <a:solidFill>
+            <a:srgbClr val="FFFF00"/>
+          </a:solidFill>
+        </p:spPr>
+        <p:txBody>
+          <a:bodyPr wrap="square" rtlCol="0">
+            <a:spAutoFit/>
+          </a:bodyPr>
+          <a:lstStyle/>
+          <a:p>
+            <a:r>
+              <a:rPr lang="en-US" altLang="zh-CN" dirty="0" smtClean="0">
+                <a:latin typeface="Arial Unicode MS" pitchFamily="34" charset="-122"/>
+                <a:ea typeface="Arial Unicode MS" pitchFamily="34" charset="-122"/>
+                <a:cs typeface="Arial Unicode MS" pitchFamily="34" charset="-122"/>
+              </a:rPr>
+              <a:t>Current time</a:t>
+            </a:r>
+            <a:endParaRPr lang="zh-CN" altLang="en-US" dirty="0">
+              <a:latin typeface="Arial Unicode MS" pitchFamily="34" charset="-122"/>
+              <a:ea typeface="Arial Unicode MS" pitchFamily="34" charset="-122"/>
+              <a:cs typeface="Arial Unicode MS" pitchFamily="34" charset="-122"/>
+            </a:endParaRPr>
+          </a:p>
+        </p:txBody>
+      </p:sp>
+      <p:sp>
+        <p:nvSpPr>
+          <p:cNvPr id="24" name="TextBox 23"/>
+          <p:cNvSpPr txBox="1"/>
+          <p:nvPr/>
+        </p:nvSpPr>
+        <p:spPr>
+          <a:xfrm>
+            <a:off x="660166" y="3807777"/>
+            <a:ext cx="1656184" cy="369332"/>
+          </a:xfrm>
+          <a:prstGeom prst="rect">
+            <a:avLst/>
+          </a:prstGeom>
+          <a:solidFill>
+            <a:srgbClr val="FFFF00"/>
+          </a:solidFill>
+        </p:spPr>
+        <p:txBody>
+          <a:bodyPr wrap="square" rtlCol="0">
+            <a:spAutoFit/>
+          </a:bodyPr>
+          <a:lstStyle/>
+          <a:p>
+            <a:r>
+              <a:rPr lang="en-US" altLang="zh-CN" dirty="0" smtClean="0">
+                <a:latin typeface="Arial Unicode MS" pitchFamily="34" charset="-122"/>
+                <a:ea typeface="Arial Unicode MS" pitchFamily="34" charset="-122"/>
+                <a:cs typeface="Arial Unicode MS" pitchFamily="34" charset="-122"/>
+              </a:rPr>
+              <a:t>Feed time</a:t>
+            </a:r>
+            <a:endParaRPr lang="zh-CN" altLang="en-US" dirty="0">
+              <a:latin typeface="Arial Unicode MS" pitchFamily="34" charset="-122"/>
+              <a:ea typeface="Arial Unicode MS" pitchFamily="34" charset="-122"/>
+              <a:cs typeface="Arial Unicode MS" pitchFamily="34" charset="-122"/>
+            </a:endParaRPr>
+          </a:p>
+        </p:txBody>
+      </p:sp>
+      <p:sp>
+        <p:nvSpPr>
+          <p:cNvPr id="25" name="TextBox 24"/>
+          <p:cNvSpPr txBox="1"/>
+          <p:nvPr/>
+        </p:nvSpPr>
+        <p:spPr>
+          <a:xfrm>
+            <a:off x="6948264" y="3373160"/>
+            <a:ext cx="1656184" cy="369332"/>
+          </a:xfrm>
+          <a:prstGeom prst="rect">
+            <a:avLst/>
+          </a:prstGeom>
+          <a:solidFill>
+            <a:srgbClr val="FFFF00"/>
+          </a:solidFill>
+        </p:spPr>
+        <p:txBody>
+          <a:bodyPr wrap="square" rtlCol="0">
+            <a:spAutoFit/>
+          </a:bodyPr>
+          <a:lstStyle/>
+          <a:p>
+            <a:r>
+              <a:rPr lang="en-US" altLang="zh-CN" dirty="0" smtClean="0">
+                <a:latin typeface="Arial Unicode MS" pitchFamily="34" charset="-122"/>
+                <a:ea typeface="Arial Unicode MS" pitchFamily="34" charset="-122"/>
+                <a:cs typeface="Arial Unicode MS" pitchFamily="34" charset="-122"/>
+              </a:rPr>
+              <a:t>Temperature</a:t>
+            </a:r>
+            <a:endParaRPr lang="zh-CN" altLang="en-US" dirty="0">
+              <a:latin typeface="Arial Unicode MS" pitchFamily="34" charset="-122"/>
+              <a:ea typeface="Arial Unicode MS" pitchFamily="34" charset="-122"/>
+              <a:cs typeface="Arial Unicode MS" pitchFamily="34" charset="-122"/>
+            </a:endParaRPr>
+          </a:p>
+        </p:txBody>
+      </p:sp>
+      <p:sp>
+        <p:nvSpPr>
+          <p:cNvPr id="26" name="TextBox 25"/>
+          <p:cNvSpPr txBox="1"/>
+          <p:nvPr/>
+        </p:nvSpPr>
+        <p:spPr>
+          <a:xfrm>
+            <a:off x="6973801" y="4198941"/>
+            <a:ext cx="1656184" cy="369332"/>
+          </a:xfrm>
+          <a:prstGeom prst="rect">
+            <a:avLst/>
+          </a:prstGeom>
+          <a:solidFill>
+            <a:srgbClr val="FFFF00"/>
+          </a:solidFill>
+        </p:spPr>
+        <p:txBody>
+          <a:bodyPr wrap="square" rtlCol="0">
+            <a:spAutoFit/>
+          </a:bodyPr>
+          <a:lstStyle/>
+          <a:p>
+            <a:r>
+              <a:rPr lang="en-US" altLang="zh-CN" dirty="0" smtClean="0">
+                <a:latin typeface="Arial Unicode MS" pitchFamily="34" charset="-122"/>
+                <a:ea typeface="Arial Unicode MS" pitchFamily="34" charset="-122"/>
+                <a:cs typeface="Arial Unicode MS" pitchFamily="34" charset="-122"/>
+              </a:rPr>
+              <a:t>humidity</a:t>
+            </a:r>
+            <a:endParaRPr lang="zh-CN" altLang="en-US" dirty="0">
+              <a:latin typeface="Arial Unicode MS" pitchFamily="34" charset="-122"/>
+              <a:ea typeface="Arial Unicode MS" pitchFamily="34" charset="-122"/>
+              <a:cs typeface="Arial Unicode MS" pitchFamily="34" charset="-122"/>
+            </a:endParaRPr>
+          </a:p>
+        </p:txBody>
+      </p:sp>
+      <p:sp>
+        <p:nvSpPr>
+          <p:cNvPr id="27" name="TextBox 26"/>
+          <p:cNvSpPr txBox="1"/>
+          <p:nvPr/>
+        </p:nvSpPr>
+        <p:spPr>
+          <a:xfrm>
+            <a:off x="539552" y="2912089"/>
+            <a:ext cx="1656184" cy="369332"/>
+          </a:xfrm>
+          <a:prstGeom prst="rect">
+            <a:avLst/>
+          </a:prstGeom>
+          <a:solidFill>
+            <a:srgbClr val="FFFF00"/>
+          </a:solidFill>
+        </p:spPr>
+        <p:txBody>
+          <a:bodyPr wrap="square" rtlCol="0">
+            <a:spAutoFit/>
+          </a:bodyPr>
+          <a:lstStyle/>
+          <a:p>
+            <a:r>
+              <a:rPr lang="en-US" altLang="zh-CN" dirty="0" smtClean="0">
+                <a:latin typeface="Arial Unicode MS" pitchFamily="34" charset="-122"/>
+                <a:ea typeface="Arial Unicode MS" pitchFamily="34" charset="-122"/>
+                <a:cs typeface="Arial Unicode MS" pitchFamily="34" charset="-122"/>
+              </a:rPr>
+              <a:t>Name</a:t>
+            </a:r>
+            <a:endParaRPr lang="zh-CN" altLang="en-US" dirty="0">
+              <a:latin typeface="Arial Unicode MS" pitchFamily="34" charset="-122"/>
+              <a:ea typeface="Arial Unicode MS" pitchFamily="34" charset="-122"/>
+              <a:cs typeface="Arial Unicode MS" pitchFamily="34" charset="-122"/>
+            </a:endParaRPr>
+          </a:p>
+        </p:txBody>
+      </p:sp>
+      <p:sp>
+        <p:nvSpPr>
+          <p:cNvPr id="28" name="TextBox 27"/>
+          <p:cNvSpPr txBox="1"/>
+          <p:nvPr/>
+        </p:nvSpPr>
+        <p:spPr>
+          <a:xfrm>
+            <a:off x="6372200" y="6009730"/>
+            <a:ext cx="2304256" cy="369332"/>
+          </a:xfrm>
+          <a:prstGeom prst="rect">
+            <a:avLst/>
+          </a:prstGeom>
+          <a:solidFill>
+            <a:srgbClr val="FFFF00"/>
+          </a:solidFill>
+        </p:spPr>
+        <p:txBody>
+          <a:bodyPr wrap="square" rtlCol="0">
+            <a:spAutoFit/>
+          </a:bodyPr>
+          <a:lstStyle/>
+          <a:p>
+            <a:r>
+              <a:rPr lang="en-US" altLang="zh-CN" dirty="0" smtClean="0">
+                <a:latin typeface="Arial Unicode MS" pitchFamily="34" charset="-122"/>
+                <a:ea typeface="Arial Unicode MS" pitchFamily="34" charset="-122"/>
+                <a:cs typeface="Arial Unicode MS" pitchFamily="34" charset="-122"/>
+              </a:rPr>
+              <a:t>Adjust feed minute</a:t>
+            </a:r>
+            <a:endParaRPr lang="zh-CN" altLang="en-US" dirty="0">
+              <a:latin typeface="Arial Unicode MS" pitchFamily="34" charset="-122"/>
+              <a:ea typeface="Arial Unicode MS" pitchFamily="34" charset="-122"/>
+              <a:cs typeface="Arial Unicode MS" pitchFamily="34" charset="-122"/>
+            </a:endParaRPr>
+          </a:p>
+        </p:txBody>
+      </p:sp>
+      <p:sp>
+        <p:nvSpPr>
+          <p:cNvPr id="29" name="TextBox 28"/>
+          <p:cNvSpPr txBox="1"/>
+          <p:nvPr/>
+        </p:nvSpPr>
+        <p:spPr>
+          <a:xfrm>
+            <a:off x="2051149" y="6194396"/>
+            <a:ext cx="3001427" cy="369332"/>
+          </a:xfrm>
+          <a:prstGeom prst="rect">
+            <a:avLst/>
+          </a:prstGeom>
+          <a:solidFill>
+            <a:srgbClr val="FFFF00"/>
+          </a:solidFill>
+        </p:spPr>
+        <p:txBody>
+          <a:bodyPr wrap="square" rtlCol="0">
+            <a:spAutoFit/>
+          </a:bodyPr>
+          <a:lstStyle/>
+          <a:p>
+            <a:r>
+              <a:rPr lang="en-US" altLang="zh-CN" dirty="0" smtClean="0">
+                <a:latin typeface="Arial Unicode MS" pitchFamily="34" charset="-122"/>
+                <a:ea typeface="Arial Unicode MS" pitchFamily="34" charset="-122"/>
+                <a:cs typeface="Arial Unicode MS" pitchFamily="34" charset="-122"/>
+              </a:rPr>
+              <a:t>Adjust current minute</a:t>
+            </a:r>
+            <a:endParaRPr lang="zh-CN" altLang="en-US" dirty="0">
+              <a:latin typeface="Arial Unicode MS" pitchFamily="34" charset="-122"/>
+              <a:ea typeface="Arial Unicode MS" pitchFamily="34" charset="-122"/>
+              <a:cs typeface="Arial Unicode MS" pitchFamily="34" charset="-122"/>
+            </a:endParaRPr>
+          </a:p>
+        </p:txBody>
+      </p:sp>
+      <p:sp>
+        <p:nvSpPr>
+          <p:cNvPr id="30" name="TextBox 29"/>
+          <p:cNvSpPr txBox="1"/>
+          <p:nvPr/>
+        </p:nvSpPr>
+        <p:spPr>
+          <a:xfrm>
+            <a:off x="827584" y="5675945"/>
+            <a:ext cx="2304256" cy="369332"/>
+          </a:xfrm>
+          <a:prstGeom prst="rect">
+            <a:avLst/>
+          </a:prstGeom>
+          <a:solidFill>
+            <a:srgbClr val="FFFF00"/>
+          </a:solidFill>
+        </p:spPr>
+        <p:txBody>
+          <a:bodyPr wrap="square" rtlCol="0">
+            <a:spAutoFit/>
+          </a:bodyPr>
+          <a:lstStyle/>
+          <a:p>
+            <a:r>
+              <a:rPr lang="en-US" altLang="zh-CN" dirty="0" smtClean="0">
+                <a:latin typeface="Arial Unicode MS" pitchFamily="34" charset="-122"/>
+                <a:ea typeface="Arial Unicode MS" pitchFamily="34" charset="-122"/>
+                <a:cs typeface="Arial Unicode MS" pitchFamily="34" charset="-122"/>
+              </a:rPr>
+              <a:t>Adjust feed hour</a:t>
+            </a:r>
+            <a:endParaRPr lang="zh-CN" altLang="en-US" dirty="0">
+              <a:latin typeface="Arial Unicode MS" pitchFamily="34" charset="-122"/>
+              <a:ea typeface="Arial Unicode MS" pitchFamily="34" charset="-122"/>
+              <a:cs typeface="Arial Unicode MS" pitchFamily="34" charset="-122"/>
+            </a:endParaRPr>
+          </a:p>
+        </p:txBody>
+      </p:sp>
+      <p:cxnSp>
+        <p:nvCxnSpPr>
+          <p:cNvPr id="6" name="直接箭头连接符 5"/>
+          <p:cNvCxnSpPr/>
+          <p:nvPr/>
+        </p:nvCxnSpPr>
+        <p:spPr>
+          <a:xfrm>
+            <a:off x="1623307" y="3243115"/>
+            <a:ext cx="572429" cy="176833"/>
+          </a:xfrm>
+          <a:prstGeom prst="straightConnector1">
+            <a:avLst/>
+          </a:prstGeom>
+          <a:ln w="19050">
+            <a:solidFill>
+              <a:srgbClr val="FF0000"/>
+            </a:solidFill>
+            <a:tailEnd type="arrow"/>
+          </a:ln>
+        </p:spPr>
+        <p:style>
+          <a:lnRef idx="1">
+            <a:schemeClr val="accent1"/>
+          </a:lnRef>
+          <a:fillRef idx="0">
+            <a:schemeClr val="accent1"/>
+          </a:fillRef>
+          <a:effectRef idx="0">
+            <a:schemeClr val="accent1"/>
+          </a:effectRef>
+          <a:fontRef idx="minor">
+            <a:schemeClr val="tx1"/>
+          </a:fontRef>
+        </p:style>
+      </p:cxnSp>
+      <p:cxnSp>
+        <p:nvCxnSpPr>
+          <p:cNvPr id="32" name="直接箭头连接符 31"/>
+          <p:cNvCxnSpPr/>
+          <p:nvPr/>
+        </p:nvCxnSpPr>
+        <p:spPr>
+          <a:xfrm>
+            <a:off x="2411760" y="3987399"/>
+            <a:ext cx="868512" cy="5044"/>
+          </a:xfrm>
+          <a:prstGeom prst="straightConnector1">
+            <a:avLst/>
+          </a:prstGeom>
+          <a:ln w="19050">
+            <a:solidFill>
+              <a:srgbClr val="FF0000"/>
+            </a:solidFill>
+            <a:tailEnd type="arrow"/>
+          </a:ln>
+        </p:spPr>
+        <p:style>
+          <a:lnRef idx="1">
+            <a:schemeClr val="accent1"/>
+          </a:lnRef>
+          <a:fillRef idx="0">
+            <a:schemeClr val="accent1"/>
+          </a:fillRef>
+          <a:effectRef idx="0">
+            <a:schemeClr val="accent1"/>
+          </a:effectRef>
+          <a:fontRef idx="minor">
+            <a:schemeClr val="tx1"/>
+          </a:fontRef>
+        </p:style>
+      </p:cxnSp>
+      <p:cxnSp>
+        <p:nvCxnSpPr>
+          <p:cNvPr id="33" name="直接箭头连接符 32"/>
+          <p:cNvCxnSpPr/>
+          <p:nvPr/>
+        </p:nvCxnSpPr>
+        <p:spPr>
+          <a:xfrm>
+            <a:off x="5489212" y="2909428"/>
+            <a:ext cx="596872" cy="342647"/>
+          </a:xfrm>
+          <a:prstGeom prst="straightConnector1">
+            <a:avLst/>
+          </a:prstGeom>
+          <a:ln w="19050">
+            <a:solidFill>
+              <a:srgbClr val="FF0000"/>
+            </a:solidFill>
+            <a:tailEnd type="arrow"/>
+          </a:ln>
+        </p:spPr>
+        <p:style>
+          <a:lnRef idx="1">
+            <a:schemeClr val="accent1"/>
+          </a:lnRef>
+          <a:fillRef idx="0">
+            <a:schemeClr val="accent1"/>
+          </a:fillRef>
+          <a:effectRef idx="0">
+            <a:schemeClr val="accent1"/>
+          </a:effectRef>
+          <a:fontRef idx="minor">
+            <a:schemeClr val="tx1"/>
+          </a:fontRef>
+        </p:style>
+      </p:cxnSp>
+      <p:cxnSp>
+        <p:nvCxnSpPr>
+          <p:cNvPr id="34" name="直接箭头连接符 33"/>
+          <p:cNvCxnSpPr/>
+          <p:nvPr/>
+        </p:nvCxnSpPr>
+        <p:spPr>
+          <a:xfrm flipH="1">
+            <a:off x="6623918" y="3584976"/>
+            <a:ext cx="324346" cy="176833"/>
+          </a:xfrm>
+          <a:prstGeom prst="straightConnector1">
+            <a:avLst/>
+          </a:prstGeom>
+          <a:ln w="19050">
+            <a:solidFill>
+              <a:srgbClr val="FF0000"/>
+            </a:solidFill>
+            <a:tailEnd type="arrow"/>
+          </a:ln>
+        </p:spPr>
+        <p:style>
+          <a:lnRef idx="1">
+            <a:schemeClr val="accent1"/>
+          </a:lnRef>
+          <a:fillRef idx="0">
+            <a:schemeClr val="accent1"/>
+          </a:fillRef>
+          <a:effectRef idx="0">
+            <a:schemeClr val="accent1"/>
+          </a:effectRef>
+          <a:fontRef idx="minor">
+            <a:schemeClr val="tx1"/>
+          </a:fontRef>
+        </p:style>
+      </p:cxnSp>
+      <p:cxnSp>
+        <p:nvCxnSpPr>
+          <p:cNvPr id="35" name="直接箭头连接符 34"/>
+          <p:cNvCxnSpPr>
+            <a:endCxn id="9" idx="2"/>
+          </p:cNvCxnSpPr>
+          <p:nvPr/>
+        </p:nvCxnSpPr>
+        <p:spPr>
+          <a:xfrm flipH="1" flipV="1">
+            <a:off x="6516216" y="4255880"/>
+            <a:ext cx="438838" cy="135560"/>
+          </a:xfrm>
+          <a:prstGeom prst="straightConnector1">
+            <a:avLst/>
+          </a:prstGeom>
+          <a:ln w="19050">
+            <a:solidFill>
+              <a:srgbClr val="FF0000"/>
+            </a:solidFill>
+            <a:tailEnd type="arrow"/>
+          </a:ln>
+        </p:spPr>
+        <p:style>
+          <a:lnRef idx="1">
+            <a:schemeClr val="accent1"/>
+          </a:lnRef>
+          <a:fillRef idx="0">
+            <a:schemeClr val="accent1"/>
+          </a:fillRef>
+          <a:effectRef idx="0">
+            <a:schemeClr val="accent1"/>
+          </a:effectRef>
+          <a:fontRef idx="minor">
+            <a:schemeClr val="tx1"/>
+          </a:fontRef>
+        </p:style>
+      </p:cxnSp>
+      <p:cxnSp>
+        <p:nvCxnSpPr>
+          <p:cNvPr id="36" name="直接箭头连接符 35"/>
+          <p:cNvCxnSpPr>
+            <a:stCxn id="29" idx="0"/>
+          </p:cNvCxnSpPr>
+          <p:nvPr/>
+        </p:nvCxnSpPr>
+        <p:spPr>
+          <a:xfrm flipH="1" flipV="1">
+            <a:off x="3169822" y="5049546"/>
+            <a:ext cx="382041" cy="1144850"/>
+          </a:xfrm>
+          <a:prstGeom prst="straightConnector1">
+            <a:avLst/>
+          </a:prstGeom>
+          <a:ln w="19050">
+            <a:solidFill>
+              <a:srgbClr val="FF0000"/>
+            </a:solidFill>
+            <a:tailEnd type="arrow"/>
+          </a:ln>
+        </p:spPr>
+        <p:style>
+          <a:lnRef idx="1">
+            <a:schemeClr val="accent1"/>
+          </a:lnRef>
+          <a:fillRef idx="0">
+            <a:schemeClr val="accent1"/>
+          </a:fillRef>
+          <a:effectRef idx="0">
+            <a:schemeClr val="accent1"/>
+          </a:effectRef>
+          <a:fontRef idx="minor">
+            <a:schemeClr val="tx1"/>
+          </a:fontRef>
+        </p:style>
+      </p:cxnSp>
+      <p:cxnSp>
+        <p:nvCxnSpPr>
+          <p:cNvPr id="37" name="直接箭头连接符 36"/>
+          <p:cNvCxnSpPr/>
+          <p:nvPr/>
+        </p:nvCxnSpPr>
+        <p:spPr>
+          <a:xfrm flipV="1">
+            <a:off x="1793058" y="4961130"/>
+            <a:ext cx="420029" cy="759271"/>
+          </a:xfrm>
+          <a:prstGeom prst="straightConnector1">
+            <a:avLst/>
+          </a:prstGeom>
+          <a:ln w="19050">
+            <a:solidFill>
+              <a:srgbClr val="FF0000"/>
+            </a:solidFill>
+            <a:tailEnd type="arrow"/>
+          </a:ln>
+        </p:spPr>
+        <p:style>
+          <a:lnRef idx="1">
+            <a:schemeClr val="accent1"/>
+          </a:lnRef>
+          <a:fillRef idx="0">
+            <a:schemeClr val="accent1"/>
+          </a:fillRef>
+          <a:effectRef idx="0">
+            <a:schemeClr val="accent1"/>
+          </a:effectRef>
+          <a:fontRef idx="minor">
+            <a:schemeClr val="tx1"/>
+          </a:fontRef>
+        </p:style>
+      </p:cxnSp>
+      <p:cxnSp>
+        <p:nvCxnSpPr>
+          <p:cNvPr id="38" name="直接箭头连接符 37"/>
+          <p:cNvCxnSpPr>
+            <a:stCxn id="28" idx="0"/>
+          </p:cNvCxnSpPr>
+          <p:nvPr/>
+        </p:nvCxnSpPr>
+        <p:spPr>
+          <a:xfrm flipH="1" flipV="1">
+            <a:off x="6732240" y="4997873"/>
+            <a:ext cx="792088" cy="1011857"/>
+          </a:xfrm>
+          <a:prstGeom prst="straightConnector1">
+            <a:avLst/>
+          </a:prstGeom>
+          <a:ln w="19050">
+            <a:solidFill>
+              <a:srgbClr val="FF0000"/>
+            </a:solidFill>
+            <a:tailEnd type="arrow"/>
+          </a:ln>
+        </p:spPr>
+        <p:style>
+          <a:lnRef idx="1">
+            <a:schemeClr val="accent1"/>
+          </a:lnRef>
+          <a:fillRef idx="0">
+            <a:schemeClr val="accent1"/>
+          </a:fillRef>
+          <a:effectRef idx="0">
+            <a:schemeClr val="accent1"/>
+          </a:effectRef>
+          <a:fontRef idx="minor">
+            <a:schemeClr val="tx1"/>
+          </a:fontRef>
+        </p:style>
+      </p:cxnSp>
+      <p:cxnSp>
+        <p:nvCxnSpPr>
+          <p:cNvPr id="39" name="直接箭头连接符 38"/>
+          <p:cNvCxnSpPr>
+            <a:stCxn id="16" idx="0"/>
+          </p:cNvCxnSpPr>
+          <p:nvPr/>
+        </p:nvCxnSpPr>
+        <p:spPr>
+          <a:xfrm flipH="1" flipV="1">
+            <a:off x="5724128" y="4997872"/>
+            <a:ext cx="288032" cy="328664"/>
+          </a:xfrm>
+          <a:prstGeom prst="straightConnector1">
+            <a:avLst/>
+          </a:prstGeom>
+          <a:ln w="19050">
+            <a:solidFill>
+              <a:srgbClr val="FF0000"/>
+            </a:solidFill>
+            <a:tailEnd type="arrow"/>
+          </a:ln>
+        </p:spPr>
+        <p:style>
+          <a:lnRef idx="1">
+            <a:schemeClr val="accent1"/>
+          </a:lnRef>
+          <a:fillRef idx="0">
+            <a:schemeClr val="accent1"/>
+          </a:fillRef>
+          <a:effectRef idx="0">
+            <a:schemeClr val="accent1"/>
+          </a:effectRef>
+          <a:fontRef idx="minor">
+            <a:schemeClr val="tx1"/>
+          </a:fontRef>
+        </p:style>
+      </p:cxnSp>
     </p:spTree>
+  </p:cSld>
+  <p:clrMapOvr>
+    <a:masterClrMapping/>
+  </p:clrMapOvr>
+</p:sld>
+</file>
+
+<file path=ppt/slides/slide3.xml><?xml version="1.0" encoding="utf-8"?>
+<p:sld xmlns:a="http://schemas.openxmlformats.org/drawingml/2006/main" xmlns:r="http://schemas.openxmlformats.org/officeDocument/2006/relationships" xmlns:p="http://schemas.openxmlformats.org/presentationml/2006/main">
+  <p:cSld>
+    <p:bg>
+      <p:bgPr>
+        <a:solidFill>
+          <a:schemeClr val="tx1">
+            <a:lumMod val="65000"/>
+            <a:lumOff val="35000"/>
+          </a:schemeClr>
+        </a:solidFill>
+        <a:effectLst/>
+      </p:bgPr>
+    </p:bg>
+    <p:spTree>
+      <p:nvGrpSpPr>
+        <p:cNvPr id="1" name=""/>
+        <p:cNvGrpSpPr/>
+        <p:nvPr/>
+      </p:nvGrpSpPr>
+      <p:grpSpPr>
+        <a:xfrm>
+          <a:off x="0" y="0"/>
+          <a:ext cx="0" cy="0"/>
+          <a:chOff x="0" y="0"/>
+          <a:chExt cx="0" cy="0"/>
+        </a:xfrm>
+      </p:grpSpPr>
+      <p:sp>
+        <p:nvSpPr>
+          <p:cNvPr id="3" name="圆角矩形 2"/>
+          <p:cNvSpPr/>
+          <p:nvPr/>
+        </p:nvSpPr>
+        <p:spPr>
+          <a:xfrm>
+            <a:off x="2123728" y="2060848"/>
+            <a:ext cx="3312368" cy="3744416"/>
+          </a:xfrm>
+          <a:prstGeom prst="roundRect">
+            <a:avLst/>
+          </a:prstGeom>
+        </p:spPr>
+        <p:style>
+          <a:lnRef idx="2">
+            <a:schemeClr val="accent1">
+              <a:shade val="50000"/>
+            </a:schemeClr>
+          </a:lnRef>
+          <a:fillRef idx="1">
+            <a:schemeClr val="accent1"/>
+          </a:fillRef>
+          <a:effectRef idx="0">
+            <a:schemeClr val="accent1"/>
+          </a:effectRef>
+          <a:fontRef idx="minor">
+            <a:schemeClr val="lt1"/>
+          </a:fontRef>
+        </p:style>
+        <p:txBody>
+          <a:bodyPr rtlCol="0" anchor="ctr"/>
+          <a:lstStyle/>
+          <a:p>
+            <a:pPr algn="ctr"/>
+            <a:endParaRPr lang="zh-CN" altLang="en-US"/>
+          </a:p>
+        </p:txBody>
+      </p:sp>
+      <p:sp>
+        <p:nvSpPr>
+          <p:cNvPr id="40" name="TextBox 39"/>
+          <p:cNvSpPr txBox="1"/>
+          <p:nvPr/>
+        </p:nvSpPr>
+        <p:spPr>
+          <a:xfrm>
+            <a:off x="2772646" y="4925536"/>
+            <a:ext cx="2081016" cy="369332"/>
+          </a:xfrm>
+          <a:prstGeom prst="rect">
+            <a:avLst/>
+          </a:prstGeom>
+          <a:noFill/>
+          <a:ln>
+            <a:solidFill>
+              <a:schemeClr val="tx1"/>
+            </a:solidFill>
+          </a:ln>
+        </p:spPr>
+        <p:txBody>
+          <a:bodyPr wrap="square" rtlCol="0">
+            <a:spAutoFit/>
+          </a:bodyPr>
+          <a:lstStyle/>
+          <a:p>
+            <a:r>
+              <a:rPr lang="en-US" altLang="zh-CN" dirty="0" smtClean="0">
+                <a:latin typeface="Arial Unicode MS" pitchFamily="34" charset="-122"/>
+                <a:ea typeface="Arial Unicode MS" pitchFamily="34" charset="-122"/>
+                <a:cs typeface="Arial Unicode MS" pitchFamily="34" charset="-122"/>
+              </a:rPr>
+              <a:t>WDT*(not used)</a:t>
+            </a:r>
+            <a:endParaRPr lang="zh-CN" altLang="en-US" dirty="0">
+              <a:latin typeface="Arial Unicode MS" pitchFamily="34" charset="-122"/>
+              <a:ea typeface="Arial Unicode MS" pitchFamily="34" charset="-122"/>
+              <a:cs typeface="Arial Unicode MS" pitchFamily="34" charset="-122"/>
+            </a:endParaRPr>
+          </a:p>
+        </p:txBody>
+      </p:sp>
+      <p:sp>
+        <p:nvSpPr>
+          <p:cNvPr id="41" name="TextBox 40"/>
+          <p:cNvSpPr txBox="1"/>
+          <p:nvPr/>
+        </p:nvSpPr>
+        <p:spPr>
+          <a:xfrm>
+            <a:off x="2765430" y="5294868"/>
+            <a:ext cx="2088232" cy="369332"/>
+          </a:xfrm>
+          <a:prstGeom prst="rect">
+            <a:avLst/>
+          </a:prstGeom>
+          <a:noFill/>
+          <a:ln>
+            <a:solidFill>
+              <a:schemeClr val="tx1"/>
+            </a:solidFill>
+          </a:ln>
+        </p:spPr>
+        <p:txBody>
+          <a:bodyPr wrap="square" rtlCol="0">
+            <a:spAutoFit/>
+          </a:bodyPr>
+          <a:lstStyle/>
+          <a:p>
+            <a:r>
+              <a:rPr lang="en-US" altLang="zh-CN" dirty="0" smtClean="0">
+                <a:latin typeface="Arial Unicode MS" pitchFamily="34" charset="-122"/>
+                <a:ea typeface="Arial Unicode MS" pitchFamily="34" charset="-122"/>
+                <a:cs typeface="Arial Unicode MS" pitchFamily="34" charset="-122"/>
+              </a:rPr>
+              <a:t>I2C* (reserved)</a:t>
+            </a:r>
+            <a:endParaRPr lang="zh-CN" altLang="en-US" dirty="0">
+              <a:latin typeface="Arial Unicode MS" pitchFamily="34" charset="-122"/>
+              <a:ea typeface="Arial Unicode MS" pitchFamily="34" charset="-122"/>
+              <a:cs typeface="Arial Unicode MS" pitchFamily="34" charset="-122"/>
+            </a:endParaRPr>
+          </a:p>
+        </p:txBody>
+      </p:sp>
+      <p:sp>
+        <p:nvSpPr>
+          <p:cNvPr id="45" name="TextBox 44"/>
+          <p:cNvSpPr txBox="1"/>
+          <p:nvPr/>
+        </p:nvSpPr>
+        <p:spPr>
+          <a:xfrm>
+            <a:off x="2345081" y="3684799"/>
+            <a:ext cx="855129" cy="369332"/>
+          </a:xfrm>
+          <a:prstGeom prst="rect">
+            <a:avLst/>
+          </a:prstGeom>
+          <a:noFill/>
+          <a:ln>
+            <a:solidFill>
+              <a:schemeClr val="tx1"/>
+            </a:solidFill>
+          </a:ln>
+        </p:spPr>
+        <p:txBody>
+          <a:bodyPr wrap="square" rtlCol="0">
+            <a:spAutoFit/>
+          </a:bodyPr>
+          <a:lstStyle/>
+          <a:p>
+            <a:r>
+              <a:rPr lang="en-US" altLang="zh-CN" dirty="0" smtClean="0">
+                <a:latin typeface="Arial Unicode MS" pitchFamily="34" charset="-122"/>
+                <a:ea typeface="Arial Unicode MS" pitchFamily="34" charset="-122"/>
+                <a:cs typeface="Arial Unicode MS" pitchFamily="34" charset="-122"/>
+              </a:rPr>
+              <a:t>CSI0</a:t>
+            </a:r>
+            <a:endParaRPr lang="zh-CN" altLang="en-US" dirty="0">
+              <a:latin typeface="Arial Unicode MS" pitchFamily="34" charset="-122"/>
+              <a:ea typeface="Arial Unicode MS" pitchFamily="34" charset="-122"/>
+              <a:cs typeface="Arial Unicode MS" pitchFamily="34" charset="-122"/>
+            </a:endParaRPr>
+          </a:p>
+        </p:txBody>
+      </p:sp>
+      <p:sp>
+        <p:nvSpPr>
+          <p:cNvPr id="46" name="TextBox 45"/>
+          <p:cNvSpPr txBox="1"/>
+          <p:nvPr/>
+        </p:nvSpPr>
+        <p:spPr>
+          <a:xfrm>
+            <a:off x="4171782" y="3684799"/>
+            <a:ext cx="855129" cy="369332"/>
+          </a:xfrm>
+          <a:prstGeom prst="rect">
+            <a:avLst/>
+          </a:prstGeom>
+          <a:noFill/>
+          <a:ln>
+            <a:solidFill>
+              <a:schemeClr val="tx1"/>
+            </a:solidFill>
+          </a:ln>
+        </p:spPr>
+        <p:txBody>
+          <a:bodyPr wrap="square" rtlCol="0">
+            <a:spAutoFit/>
+          </a:bodyPr>
+          <a:lstStyle/>
+          <a:p>
+            <a:r>
+              <a:rPr lang="en-US" altLang="zh-CN" dirty="0" smtClean="0">
+                <a:latin typeface="Arial Unicode MS" pitchFamily="34" charset="-122"/>
+                <a:ea typeface="Arial Unicode MS" pitchFamily="34" charset="-122"/>
+                <a:cs typeface="Arial Unicode MS" pitchFamily="34" charset="-122"/>
+              </a:rPr>
+              <a:t>timer0</a:t>
+            </a:r>
+            <a:endParaRPr lang="zh-CN" altLang="en-US" dirty="0">
+              <a:latin typeface="Arial Unicode MS" pitchFamily="34" charset="-122"/>
+              <a:ea typeface="Arial Unicode MS" pitchFamily="34" charset="-122"/>
+              <a:cs typeface="Arial Unicode MS" pitchFamily="34" charset="-122"/>
+            </a:endParaRPr>
+          </a:p>
+        </p:txBody>
+      </p:sp>
+      <p:sp>
+        <p:nvSpPr>
+          <p:cNvPr id="8" name="矩形 7"/>
+          <p:cNvSpPr/>
+          <p:nvPr/>
+        </p:nvSpPr>
+        <p:spPr>
+          <a:xfrm>
+            <a:off x="6372200" y="457085"/>
+            <a:ext cx="1584176" cy="504056"/>
+          </a:xfrm>
+          <a:prstGeom prst="rect">
+            <a:avLst/>
+          </a:prstGeom>
+        </p:spPr>
+        <p:style>
+          <a:lnRef idx="2">
+            <a:schemeClr val="accent1">
+              <a:shade val="50000"/>
+            </a:schemeClr>
+          </a:lnRef>
+          <a:fillRef idx="1">
+            <a:schemeClr val="accent1"/>
+          </a:fillRef>
+          <a:effectRef idx="0">
+            <a:schemeClr val="accent1"/>
+          </a:effectRef>
+          <a:fontRef idx="minor">
+            <a:schemeClr val="lt1"/>
+          </a:fontRef>
+        </p:style>
+        <p:txBody>
+          <a:bodyPr rtlCol="0" anchor="ctr"/>
+          <a:lstStyle/>
+          <a:p>
+            <a:pPr algn="ctr"/>
+            <a:r>
+              <a:rPr lang="en-US" altLang="zh-CN" dirty="0" smtClean="0">
+                <a:solidFill>
+                  <a:schemeClr val="tx1"/>
+                </a:solidFill>
+              </a:rPr>
+              <a:t>keys</a:t>
+            </a:r>
+            <a:endParaRPr lang="zh-CN" altLang="en-US" dirty="0">
+              <a:solidFill>
+                <a:schemeClr val="tx1"/>
+              </a:solidFill>
+            </a:endParaRPr>
+          </a:p>
+        </p:txBody>
+      </p:sp>
+      <p:sp>
+        <p:nvSpPr>
+          <p:cNvPr id="50" name="矩形 49"/>
+          <p:cNvSpPr/>
+          <p:nvPr/>
+        </p:nvSpPr>
+        <p:spPr>
+          <a:xfrm>
+            <a:off x="6372200" y="2371202"/>
+            <a:ext cx="1584176" cy="792088"/>
+          </a:xfrm>
+          <a:prstGeom prst="rect">
+            <a:avLst/>
+          </a:prstGeom>
+        </p:spPr>
+        <p:style>
+          <a:lnRef idx="2">
+            <a:schemeClr val="accent1">
+              <a:shade val="50000"/>
+            </a:schemeClr>
+          </a:lnRef>
+          <a:fillRef idx="1">
+            <a:schemeClr val="accent1"/>
+          </a:fillRef>
+          <a:effectRef idx="0">
+            <a:schemeClr val="accent1"/>
+          </a:effectRef>
+          <a:fontRef idx="minor">
+            <a:schemeClr val="lt1"/>
+          </a:fontRef>
+        </p:style>
+        <p:txBody>
+          <a:bodyPr rtlCol="0" anchor="ctr"/>
+          <a:lstStyle/>
+          <a:p>
+            <a:pPr algn="ctr"/>
+            <a:r>
+              <a:rPr lang="en-US" altLang="zh-CN" dirty="0" smtClean="0">
+                <a:solidFill>
+                  <a:schemeClr val="tx1"/>
+                </a:solidFill>
+              </a:rPr>
+              <a:t>motor</a:t>
+            </a:r>
+            <a:endParaRPr lang="zh-CN" altLang="en-US" dirty="0">
+              <a:solidFill>
+                <a:schemeClr val="tx1"/>
+              </a:solidFill>
+            </a:endParaRPr>
+          </a:p>
+        </p:txBody>
+      </p:sp>
+      <p:sp>
+        <p:nvSpPr>
+          <p:cNvPr id="51" name="矩形 50"/>
+          <p:cNvSpPr/>
+          <p:nvPr/>
+        </p:nvSpPr>
+        <p:spPr>
+          <a:xfrm>
+            <a:off x="6390259" y="3869465"/>
+            <a:ext cx="1584176" cy="1832433"/>
+          </a:xfrm>
+          <a:prstGeom prst="rect">
+            <a:avLst/>
+          </a:prstGeom>
+        </p:spPr>
+        <p:style>
+          <a:lnRef idx="2">
+            <a:schemeClr val="accent1">
+              <a:shade val="50000"/>
+            </a:schemeClr>
+          </a:lnRef>
+          <a:fillRef idx="1">
+            <a:schemeClr val="accent1"/>
+          </a:fillRef>
+          <a:effectRef idx="0">
+            <a:schemeClr val="accent1"/>
+          </a:effectRef>
+          <a:fontRef idx="minor">
+            <a:schemeClr val="lt1"/>
+          </a:fontRef>
+        </p:style>
+        <p:txBody>
+          <a:bodyPr rtlCol="0" anchor="ctr"/>
+          <a:lstStyle/>
+          <a:p>
+            <a:pPr algn="ctr"/>
+            <a:r>
+              <a:rPr lang="en-US" altLang="zh-CN" dirty="0" smtClean="0">
+                <a:solidFill>
+                  <a:schemeClr val="tx1"/>
+                </a:solidFill>
+              </a:rPr>
+              <a:t>OLED</a:t>
+            </a:r>
+            <a:endParaRPr lang="zh-CN" altLang="en-US" dirty="0">
+              <a:solidFill>
+                <a:schemeClr val="tx1"/>
+              </a:solidFill>
+            </a:endParaRPr>
+          </a:p>
+        </p:txBody>
+      </p:sp>
+      <p:sp>
+        <p:nvSpPr>
+          <p:cNvPr id="52" name="矩形 51"/>
+          <p:cNvSpPr/>
+          <p:nvPr/>
+        </p:nvSpPr>
+        <p:spPr>
+          <a:xfrm>
+            <a:off x="6372200" y="1052736"/>
+            <a:ext cx="1584176" cy="432048"/>
+          </a:xfrm>
+          <a:prstGeom prst="rect">
+            <a:avLst/>
+          </a:prstGeom>
+        </p:spPr>
+        <p:style>
+          <a:lnRef idx="2">
+            <a:schemeClr val="accent1">
+              <a:shade val="50000"/>
+            </a:schemeClr>
+          </a:lnRef>
+          <a:fillRef idx="1">
+            <a:schemeClr val="accent1"/>
+          </a:fillRef>
+          <a:effectRef idx="0">
+            <a:schemeClr val="accent1"/>
+          </a:effectRef>
+          <a:fontRef idx="minor">
+            <a:schemeClr val="lt1"/>
+          </a:fontRef>
+        </p:style>
+        <p:txBody>
+          <a:bodyPr rtlCol="0" anchor="ctr"/>
+          <a:lstStyle/>
+          <a:p>
+            <a:pPr algn="ctr"/>
+            <a:r>
+              <a:rPr lang="en-US" altLang="zh-CN" dirty="0" smtClean="0">
+                <a:solidFill>
+                  <a:schemeClr val="tx1"/>
+                </a:solidFill>
+              </a:rPr>
+              <a:t>LED</a:t>
+            </a:r>
+            <a:endParaRPr lang="zh-CN" altLang="en-US" dirty="0">
+              <a:solidFill>
+                <a:schemeClr val="tx1"/>
+              </a:solidFill>
+            </a:endParaRPr>
+          </a:p>
+        </p:txBody>
+      </p:sp>
+      <p:sp>
+        <p:nvSpPr>
+          <p:cNvPr id="53" name="矩形 52"/>
+          <p:cNvSpPr/>
+          <p:nvPr/>
+        </p:nvSpPr>
+        <p:spPr>
+          <a:xfrm>
+            <a:off x="292090" y="3473421"/>
+            <a:ext cx="1584176" cy="792088"/>
+          </a:xfrm>
+          <a:prstGeom prst="rect">
+            <a:avLst/>
+          </a:prstGeom>
+        </p:spPr>
+        <p:style>
+          <a:lnRef idx="2">
+            <a:schemeClr val="accent1">
+              <a:shade val="50000"/>
+            </a:schemeClr>
+          </a:lnRef>
+          <a:fillRef idx="1">
+            <a:schemeClr val="accent1"/>
+          </a:fillRef>
+          <a:effectRef idx="0">
+            <a:schemeClr val="accent1"/>
+          </a:effectRef>
+          <a:fontRef idx="minor">
+            <a:schemeClr val="lt1"/>
+          </a:fontRef>
+        </p:style>
+        <p:txBody>
+          <a:bodyPr rtlCol="0" anchor="ctr"/>
+          <a:lstStyle/>
+          <a:p>
+            <a:pPr algn="ctr"/>
+            <a:r>
+              <a:rPr lang="en-US" altLang="zh-CN" dirty="0" smtClean="0">
+                <a:solidFill>
+                  <a:schemeClr val="tx1"/>
+                </a:solidFill>
+              </a:rPr>
+              <a:t>Flash</a:t>
+            </a:r>
+            <a:endParaRPr lang="zh-CN" altLang="en-US" dirty="0">
+              <a:solidFill>
+                <a:schemeClr val="tx1"/>
+              </a:solidFill>
+            </a:endParaRPr>
+          </a:p>
+        </p:txBody>
+      </p:sp>
+      <p:sp>
+        <p:nvSpPr>
+          <p:cNvPr id="11" name="TextBox 10"/>
+          <p:cNvSpPr txBox="1"/>
+          <p:nvPr/>
+        </p:nvSpPr>
+        <p:spPr>
+          <a:xfrm>
+            <a:off x="2265925" y="2294104"/>
+            <a:ext cx="3027974" cy="523220"/>
+          </a:xfrm>
+          <a:prstGeom prst="rect">
+            <a:avLst/>
+          </a:prstGeom>
+          <a:noFill/>
+          <a:ln>
+            <a:noFill/>
+          </a:ln>
+        </p:spPr>
+        <p:txBody>
+          <a:bodyPr wrap="square" rtlCol="0">
+            <a:spAutoFit/>
+          </a:bodyPr>
+          <a:lstStyle/>
+          <a:p>
+            <a:r>
+              <a:rPr lang="en-US" altLang="zh-CN" sz="2800" dirty="0" smtClean="0">
+                <a:latin typeface="Arial Unicode MS" pitchFamily="34" charset="-122"/>
+                <a:ea typeface="Arial Unicode MS" pitchFamily="34" charset="-122"/>
+                <a:cs typeface="Arial Unicode MS" pitchFamily="34" charset="-122"/>
+              </a:rPr>
+              <a:t>R5F212A8</a:t>
+            </a:r>
+            <a:endParaRPr lang="zh-CN" altLang="en-US" sz="2800" dirty="0">
+              <a:latin typeface="Arial Unicode MS" pitchFamily="34" charset="-122"/>
+              <a:ea typeface="Arial Unicode MS" pitchFamily="34" charset="-122"/>
+              <a:cs typeface="Arial Unicode MS" pitchFamily="34" charset="-122"/>
+            </a:endParaRPr>
+          </a:p>
+        </p:txBody>
+      </p:sp>
+      <p:cxnSp>
+        <p:nvCxnSpPr>
+          <p:cNvPr id="14" name="直接连接符 13"/>
+          <p:cNvCxnSpPr>
+            <a:stCxn id="53" idx="3"/>
+            <a:endCxn id="45" idx="1"/>
+          </p:cNvCxnSpPr>
+          <p:nvPr/>
+        </p:nvCxnSpPr>
+        <p:spPr>
+          <a:xfrm>
+            <a:off x="1876266" y="3869465"/>
+            <a:ext cx="468815" cy="0"/>
+          </a:xfrm>
+          <a:prstGeom prst="line">
+            <a:avLst/>
+          </a:prstGeom>
+        </p:spPr>
+        <p:style>
+          <a:lnRef idx="1">
+            <a:schemeClr val="accent1"/>
+          </a:lnRef>
+          <a:fillRef idx="0">
+            <a:schemeClr val="accent1"/>
+          </a:fillRef>
+          <a:effectRef idx="0">
+            <a:schemeClr val="accent1"/>
+          </a:effectRef>
+          <a:fontRef idx="minor">
+            <a:schemeClr val="tx1"/>
+          </a:fontRef>
+        </p:style>
+      </p:cxnSp>
+      <p:cxnSp>
+        <p:nvCxnSpPr>
+          <p:cNvPr id="55" name="直接连接符 54"/>
+          <p:cNvCxnSpPr/>
+          <p:nvPr/>
+        </p:nvCxnSpPr>
+        <p:spPr>
+          <a:xfrm>
+            <a:off x="5903385" y="2767246"/>
+            <a:ext cx="468815" cy="0"/>
+          </a:xfrm>
+          <a:prstGeom prst="line">
+            <a:avLst/>
+          </a:prstGeom>
+        </p:spPr>
+        <p:style>
+          <a:lnRef idx="1">
+            <a:schemeClr val="accent1"/>
+          </a:lnRef>
+          <a:fillRef idx="0">
+            <a:schemeClr val="accent1"/>
+          </a:fillRef>
+          <a:effectRef idx="0">
+            <a:schemeClr val="accent1"/>
+          </a:effectRef>
+          <a:fontRef idx="minor">
+            <a:schemeClr val="tx1"/>
+          </a:fontRef>
+        </p:style>
+      </p:cxnSp>
+      <p:cxnSp>
+        <p:nvCxnSpPr>
+          <p:cNvPr id="31" name="直接连接符 30"/>
+          <p:cNvCxnSpPr/>
+          <p:nvPr/>
+        </p:nvCxnSpPr>
+        <p:spPr>
+          <a:xfrm>
+            <a:off x="5903385" y="709113"/>
+            <a:ext cx="0" cy="4216423"/>
+          </a:xfrm>
+          <a:prstGeom prst="line">
+            <a:avLst/>
+          </a:prstGeom>
+        </p:spPr>
+        <p:style>
+          <a:lnRef idx="1">
+            <a:schemeClr val="accent1"/>
+          </a:lnRef>
+          <a:fillRef idx="0">
+            <a:schemeClr val="accent1"/>
+          </a:fillRef>
+          <a:effectRef idx="0">
+            <a:schemeClr val="accent1"/>
+          </a:effectRef>
+          <a:fontRef idx="minor">
+            <a:schemeClr val="tx1"/>
+          </a:fontRef>
+        </p:style>
+      </p:cxnSp>
+      <p:cxnSp>
+        <p:nvCxnSpPr>
+          <p:cNvPr id="56" name="直接连接符 55"/>
+          <p:cNvCxnSpPr/>
+          <p:nvPr/>
+        </p:nvCxnSpPr>
+        <p:spPr>
+          <a:xfrm>
+            <a:off x="5921444" y="4925536"/>
+            <a:ext cx="468815" cy="0"/>
+          </a:xfrm>
+          <a:prstGeom prst="line">
+            <a:avLst/>
+          </a:prstGeom>
+        </p:spPr>
+        <p:style>
+          <a:lnRef idx="1">
+            <a:schemeClr val="accent1"/>
+          </a:lnRef>
+          <a:fillRef idx="0">
+            <a:schemeClr val="accent1"/>
+          </a:fillRef>
+          <a:effectRef idx="0">
+            <a:schemeClr val="accent1"/>
+          </a:effectRef>
+          <a:fontRef idx="minor">
+            <a:schemeClr val="tx1"/>
+          </a:fontRef>
+        </p:style>
+      </p:cxnSp>
+      <p:cxnSp>
+        <p:nvCxnSpPr>
+          <p:cNvPr id="57" name="直接连接符 56"/>
+          <p:cNvCxnSpPr/>
+          <p:nvPr/>
+        </p:nvCxnSpPr>
+        <p:spPr>
+          <a:xfrm>
+            <a:off x="5921444" y="1229116"/>
+            <a:ext cx="468815" cy="0"/>
+          </a:xfrm>
+          <a:prstGeom prst="line">
+            <a:avLst/>
+          </a:prstGeom>
+        </p:spPr>
+        <p:style>
+          <a:lnRef idx="1">
+            <a:schemeClr val="accent1"/>
+          </a:lnRef>
+          <a:fillRef idx="0">
+            <a:schemeClr val="accent1"/>
+          </a:fillRef>
+          <a:effectRef idx="0">
+            <a:schemeClr val="accent1"/>
+          </a:effectRef>
+          <a:fontRef idx="minor">
+            <a:schemeClr val="tx1"/>
+          </a:fontRef>
+        </p:style>
+      </p:cxnSp>
+      <p:cxnSp>
+        <p:nvCxnSpPr>
+          <p:cNvPr id="58" name="直接连接符 57"/>
+          <p:cNvCxnSpPr/>
+          <p:nvPr/>
+        </p:nvCxnSpPr>
+        <p:spPr>
+          <a:xfrm>
+            <a:off x="5891770" y="709113"/>
+            <a:ext cx="468815" cy="0"/>
+          </a:xfrm>
+          <a:prstGeom prst="line">
+            <a:avLst/>
+          </a:prstGeom>
+        </p:spPr>
+        <p:style>
+          <a:lnRef idx="1">
+            <a:schemeClr val="accent1"/>
+          </a:lnRef>
+          <a:fillRef idx="0">
+            <a:schemeClr val="accent1"/>
+          </a:fillRef>
+          <a:effectRef idx="0">
+            <a:schemeClr val="accent1"/>
+          </a:effectRef>
+          <a:fontRef idx="minor">
+            <a:schemeClr val="tx1"/>
+          </a:fontRef>
+        </p:style>
+      </p:cxnSp>
+      <p:cxnSp>
+        <p:nvCxnSpPr>
+          <p:cNvPr id="59" name="直接连接符 58"/>
+          <p:cNvCxnSpPr/>
+          <p:nvPr/>
+        </p:nvCxnSpPr>
+        <p:spPr>
+          <a:xfrm>
+            <a:off x="5422955" y="2767246"/>
+            <a:ext cx="468815" cy="0"/>
+          </a:xfrm>
+          <a:prstGeom prst="line">
+            <a:avLst/>
+          </a:prstGeom>
+        </p:spPr>
+        <p:style>
+          <a:lnRef idx="1">
+            <a:schemeClr val="accent1"/>
+          </a:lnRef>
+          <a:fillRef idx="0">
+            <a:schemeClr val="accent1"/>
+          </a:fillRef>
+          <a:effectRef idx="0">
+            <a:schemeClr val="accent1"/>
+          </a:effectRef>
+          <a:fontRef idx="minor">
+            <a:schemeClr val="tx1"/>
+          </a:fontRef>
+        </p:style>
+      </p:cxnSp>
+      <p:sp>
+        <p:nvSpPr>
+          <p:cNvPr id="60" name="TextBox 59"/>
+          <p:cNvSpPr txBox="1"/>
+          <p:nvPr/>
+        </p:nvSpPr>
+        <p:spPr>
+          <a:xfrm>
+            <a:off x="4630867" y="2601307"/>
+            <a:ext cx="792088" cy="369332"/>
+          </a:xfrm>
+          <a:prstGeom prst="rect">
+            <a:avLst/>
+          </a:prstGeom>
+          <a:noFill/>
+          <a:ln>
+            <a:solidFill>
+              <a:schemeClr val="tx1"/>
+            </a:solidFill>
+          </a:ln>
+        </p:spPr>
+        <p:txBody>
+          <a:bodyPr wrap="square" rtlCol="0">
+            <a:spAutoFit/>
+          </a:bodyPr>
+          <a:lstStyle/>
+          <a:p>
+            <a:r>
+              <a:rPr lang="en-US" altLang="zh-CN" dirty="0" smtClean="0"/>
+              <a:t>port</a:t>
+            </a:r>
+            <a:endParaRPr lang="zh-CN" altLang="en-US" dirty="0"/>
+          </a:p>
+        </p:txBody>
+      </p:sp>
+    </p:spTree>
+    <p:extLst>
+      <p:ext uri="{BB962C8B-B14F-4D97-AF65-F5344CB8AC3E}">
+        <p14:creationId xmlns:p14="http://schemas.microsoft.com/office/powerpoint/2010/main" val="824490422"/>
+      </p:ext>
+    </p:extLst>
   </p:cSld>
   <p:clrMapOvr>
     <a:masterClrMapping/>

</xml_diff>